<commit_message>
Some fixups, add inc feature for date-time, and provide some sample shape.jsch files.
</commit_message>
<xml_diff>
--- a/ipsum.pptx
+++ b/ipsum.pptx
@@ -202,7 +202,7 @@
           <a:p>
             <a:fld id="{809650F9-9A3E-EC42-ACF5-9A50B944BD6F}" type="datetimeFigureOut">
               <a:rPr lang="en-US" smtClean="0"/>
-              <a:t>12/6/13</a:t>
+              <a:t>12/11/13</a:t>
             </a:fld>
             <a:endParaRPr lang="en-US"/>
           </a:p>
@@ -367,7 +367,7 @@
           <a:p>
             <a:fld id="{432F3386-1435-B645-8E2D-EAE70419FE1C}" type="datetimeFigureOut">
               <a:rPr lang="en-US" smtClean="0"/>
-              <a:t>12/6/13</a:t>
+              <a:t>12/11/13</a:t>
             </a:fld>
             <a:endParaRPr lang="en-US"/>
           </a:p>
@@ -5888,14 +5888,14 @@
           <p:nvPr>
             <p:extLst>
               <p:ext uri="{D42A27DB-BD31-4B8C-83A1-F6EECF244321}">
-                <p14:modId xmlns:p14="http://schemas.microsoft.com/office/powerpoint/2010/main" val="1956264226"/>
+                <p14:modId xmlns:p14="http://schemas.microsoft.com/office/powerpoint/2010/main" val="2250415803"/>
               </p:ext>
             </p:extLst>
           </p:nvPr>
         </p:nvGraphicFramePr>
         <p:xfrm>
           <a:off x="898071" y="1397000"/>
-          <a:ext cx="7238999" cy="3317239"/>
+          <a:ext cx="7238999" cy="4353559"/>
         </p:xfrm>
         <a:graphic>
           <a:graphicData uri="http://schemas.openxmlformats.org/drawingml/2006/table">
@@ -5904,8 +5904,8 @@
                 <a:tableStyleId>{5C22544A-7EE6-4342-B048-85BDC9FD1C3A}</a:tableStyleId>
               </a:tblPr>
               <a:tblGrid>
-                <a:gridCol w="3610429"/>
-                <a:gridCol w="3628570"/>
+                <a:gridCol w="3022768"/>
+                <a:gridCol w="4216231"/>
               </a:tblGrid>
               <a:tr h="370840">
                 <a:tc>
@@ -6015,7 +6015,7 @@
                       </a:r>
                       <a:r>
                         <a:rPr lang="en-US" sz="1400" baseline="0" dirty="0" smtClean="0"/>
-                        <a:t>”</a:t>
+                        <a:t>” **</a:t>
                       </a:r>
                       <a:endParaRPr lang="en-US" sz="1400" dirty="0"/>
                     </a:p>
@@ -6129,6 +6129,126 @@
                         <a:t>eger, float, or date** &lt;= v</a:t>
                       </a:r>
                       <a:endParaRPr lang="en-US" sz="1400" dirty="0" smtClean="0"/>
+                    </a:p>
+                  </a:txBody>
+                  <a:tcPr/>
+                </a:tc>
+              </a:tr>
+              <a:tr h="370840">
+                <a:tc>
+                  <a:txBody>
+                    <a:bodyPr/>
+                    <a:lstStyle/>
+                    <a:p>
+                      <a:r>
+                        <a:rPr lang="en-US" sz="1400" dirty="0" smtClean="0">
+                          <a:latin typeface="Courier"/>
+                          <a:cs typeface="Courier"/>
+                        </a:rPr>
+                        <a:t>“</a:t>
+                      </a:r>
+                      <a:r>
+                        <a:rPr lang="en-US" sz="1400" dirty="0" err="1" smtClean="0">
+                          <a:latin typeface="Courier"/>
+                          <a:cs typeface="Courier"/>
+                        </a:rPr>
+                        <a:t>minItems</a:t>
+                      </a:r>
+                      <a:r>
+                        <a:rPr lang="en-US" sz="1400" dirty="0" smtClean="0">
+                          <a:latin typeface="Courier"/>
+                          <a:cs typeface="Courier"/>
+                        </a:rPr>
+                        <a:t>”: v</a:t>
+                      </a:r>
+                      <a:endParaRPr lang="en-US" sz="1400" dirty="0">
+                        <a:latin typeface="Courier"/>
+                        <a:cs typeface="Courier"/>
+                      </a:endParaRPr>
+                    </a:p>
+                  </a:txBody>
+                  <a:tcPr/>
+                </a:tc>
+                <a:tc>
+                  <a:txBody>
+                    <a:bodyPr/>
+                    <a:lstStyle/>
+                    <a:p>
+                      <a:r>
+                        <a:rPr lang="en-US" sz="1400" dirty="0" smtClean="0"/>
+                        <a:t>(array type) Smallest</a:t>
+                      </a:r>
+                      <a:r>
+                        <a:rPr lang="en-US" sz="1400" baseline="0" dirty="0" smtClean="0"/>
+                        <a:t> number of items to put in an array (default is 1)</a:t>
+                      </a:r>
+                      <a:endParaRPr lang="en-US" sz="1400" dirty="0"/>
+                    </a:p>
+                  </a:txBody>
+                  <a:tcPr/>
+                </a:tc>
+              </a:tr>
+              <a:tr h="370840">
+                <a:tc>
+                  <a:txBody>
+                    <a:bodyPr/>
+                    <a:lstStyle/>
+                    <a:p>
+                      <a:r>
+                        <a:rPr lang="en-US" sz="1400" dirty="0" smtClean="0">
+                          <a:latin typeface="Courier"/>
+                          <a:cs typeface="Courier"/>
+                        </a:rPr>
+                        <a:t>“</a:t>
+                      </a:r>
+                      <a:r>
+                        <a:rPr lang="en-US" sz="1400" dirty="0" err="1" smtClean="0">
+                          <a:latin typeface="Courier"/>
+                          <a:cs typeface="Courier"/>
+                        </a:rPr>
+                        <a:t>maxItems</a:t>
+                      </a:r>
+                      <a:r>
+                        <a:rPr lang="en-US" sz="1400" dirty="0" smtClean="0">
+                          <a:latin typeface="Courier"/>
+                          <a:cs typeface="Courier"/>
+                        </a:rPr>
+                        <a:t>”: v</a:t>
+                      </a:r>
+                      <a:endParaRPr lang="en-US" sz="1400" dirty="0">
+                        <a:latin typeface="Courier"/>
+                        <a:cs typeface="Courier"/>
+                      </a:endParaRPr>
+                    </a:p>
+                  </a:txBody>
+                  <a:tcPr/>
+                </a:tc>
+                <a:tc>
+                  <a:txBody>
+                    <a:bodyPr/>
+                    <a:lstStyle/>
+                    <a:p>
+                      <a:r>
+                        <a:rPr lang="en-US" sz="1400" dirty="0" smtClean="0"/>
+                        <a:t>(array type) </a:t>
+                      </a:r>
+                      <a:r>
+                        <a:rPr lang="en-US" sz="1400" dirty="0" smtClean="0"/>
+                        <a:t>Largest </a:t>
+                      </a:r>
+                      <a:r>
+                        <a:rPr lang="en-US" sz="1400" baseline="0" dirty="0" smtClean="0"/>
+                        <a:t>number </a:t>
+                      </a:r>
+                      <a:r>
+                        <a:rPr lang="en-US" sz="1400" baseline="0" dirty="0" smtClean="0"/>
+                        <a:t>of items to put in an array (default is </a:t>
+                      </a:r>
+                      <a:r>
+                        <a:rPr lang="en-US" sz="1400" baseline="0" dirty="0" smtClean="0"/>
+                        <a:t>4)</a:t>
+                      </a:r>
+                      <a:endParaRPr lang="en-US" sz="1400" dirty="0"/>
                     </a:p>
                   </a:txBody>
                   <a:tcPr/>
@@ -6312,14 +6432,14 @@
           <p:nvPr>
             <p:extLst>
               <p:ext uri="{D42A27DB-BD31-4B8C-83A1-F6EECF244321}">
-                <p14:modId xmlns:p14="http://schemas.microsoft.com/office/powerpoint/2010/main" val="878247363"/>
+                <p14:modId xmlns:p14="http://schemas.microsoft.com/office/powerpoint/2010/main" val="3948730683"/>
               </p:ext>
             </p:extLst>
           </p:nvPr>
         </p:nvGraphicFramePr>
         <p:xfrm>
           <a:off x="825500" y="1397000"/>
-          <a:ext cx="7275286" cy="3891279"/>
+          <a:ext cx="7275286" cy="3510279"/>
         </p:xfrm>
         <a:graphic>
           <a:graphicData uri="http://schemas.openxmlformats.org/drawingml/2006/table">
@@ -6409,7 +6529,14 @@
                           <a:latin typeface="Courier"/>
                           <a:cs typeface="Courier"/>
                         </a:rPr>
-                        <a:t>": "A" }</a:t>
+                        <a:t>": </a:t>
+                      </a:r>
+                      <a:r>
+                        <a:rPr lang="nl-NL" sz="1400" dirty="0" smtClean="0">
+                          <a:latin typeface="Courier"/>
+                          <a:cs typeface="Courier"/>
+                        </a:rPr>
+                        <a:t>{”start”: v2, “val”: v3}</a:t>
                       </a:r>
                       <a:endParaRPr lang="en-US" sz="1400" dirty="0">
                         <a:latin typeface="Courier"/>
@@ -6434,15 +6561,27 @@
                       </a:r>
                       <a:r>
                         <a:rPr lang="en-US" sz="1400" dirty="0" smtClean="0"/>
-                        <a:t>, increment and use value in counter A.   Useful for creating</a:t>
+                        <a:t>, </a:t>
+                      </a:r>
+                      <a:r>
+                        <a:rPr lang="en-US" sz="1400" dirty="0" smtClean="0"/>
+                        <a:t> start with value</a:t>
                       </a:r>
                       <a:r>
                         <a:rPr lang="en-US" sz="1400" baseline="0" dirty="0" smtClean="0"/>
-                        <a:t> things like message sequential numbers</a:t>
+                        <a:t> v2 and add v3 for each successive record.  v3 can be negative.  U</a:t>
+                      </a:r>
+                      <a:r>
+                        <a:rPr lang="en-US" sz="1400" dirty="0" smtClean="0"/>
+                        <a:t>seful </a:t>
+                      </a:r>
+                      <a:r>
+                        <a:rPr lang="en-US" sz="1400" dirty="0" smtClean="0"/>
+                        <a:t>for creating</a:t>
                       </a:r>
                       <a:r>
                         <a:rPr lang="en-US" sz="1400" baseline="0" dirty="0" smtClean="0"/>
-                        <a:t>.  Different fields can use different counter buckets or share them.</a:t>
+                        <a:t> things like message sequential numbers.  </a:t>
                       </a:r>
                       <a:endParaRPr lang="en-US" sz="1400" dirty="0"/>
                     </a:p>
@@ -6457,25 +6596,76 @@
                     <a:lstStyle/>
                     <a:p>
                       <a:r>
-                        <a:rPr lang="en-US" sz="1400" dirty="0" smtClean="0">
+                        <a:rPr lang="nl-NL" sz="1400" dirty="0" smtClean="0">
+                          <a:latin typeface="Courier"/>
+                          <a:cs typeface="Courier"/>
+                        </a:rPr>
+                        <a:t>String/date-time</a:t>
+                      </a:r>
+                    </a:p>
+                    <a:p>
+                      <a:r>
+                        <a:rPr lang="nl-NL" sz="1400" dirty="0" smtClean="0">
                           <a:latin typeface="Courier"/>
                           <a:cs typeface="Courier"/>
                         </a:rPr>
                         <a:t>"</a:t>
                       </a:r>
                       <a:r>
-                        <a:rPr lang="en-US" sz="1400" dirty="0" err="1" smtClean="0">
+                        <a:rPr lang="nl-NL" sz="1400" dirty="0" err="1" smtClean="0">
                           <a:latin typeface="Courier"/>
                           <a:cs typeface="Courier"/>
                         </a:rPr>
-                        <a:t>pctRandomNull</a:t>
-                      </a:r>
-                      <a:r>
-                        <a:rPr lang="en-US" sz="1400" dirty="0" smtClean="0">
+                        <a:t>ipsum</a:t>
+                      </a:r>
+                      <a:r>
+                        <a:rPr lang="nl-NL" sz="1400" dirty="0" smtClean="0">
                           <a:latin typeface="Courier"/>
                           <a:cs typeface="Courier"/>
                         </a:rPr>
-                        <a:t>": v</a:t>
+                        <a:t>": { "</a:t>
+                      </a:r>
+                      <a:r>
+                        <a:rPr lang="nl-NL" sz="1400" dirty="0" err="1" smtClean="0">
+                          <a:latin typeface="Courier"/>
+                          <a:cs typeface="Courier"/>
+                        </a:rPr>
+                        <a:t>inc</a:t>
+                      </a:r>
+                      <a:r>
+                        <a:rPr lang="nl-NL" sz="1400" dirty="0" smtClean="0">
+                          <a:latin typeface="Courier"/>
+                          <a:cs typeface="Courier"/>
+                        </a:rPr>
+                        <a:t>": {”start”: v2, </a:t>
+                      </a:r>
+                      <a:r>
+                        <a:rPr lang="nl-NL" sz="1400" dirty="0" smtClean="0">
+                          <a:latin typeface="Courier"/>
+                          <a:cs typeface="Courier"/>
+                        </a:rPr>
+                        <a:t>“</a:t>
+                      </a:r>
+                      <a:r>
+                        <a:rPr lang="nl-NL" sz="1400" dirty="0" err="1" smtClean="0">
+                          <a:latin typeface="Courier"/>
+                          <a:cs typeface="Courier"/>
+                        </a:rPr>
+                        <a:t>secs|mins|hrs|days</a:t>
+                      </a:r>
+                      <a:r>
+                        <a:rPr lang="nl-NL" sz="1400" dirty="0" smtClean="0">
+                          <a:latin typeface="Courier"/>
+                          <a:cs typeface="Courier"/>
+                        </a:rPr>
+                        <a:t>”</a:t>
+                      </a:r>
+                      <a:r>
+                        <a:rPr lang="nl-NL" sz="1400" dirty="0" smtClean="0">
+                          <a:latin typeface="Courier"/>
+                          <a:cs typeface="Courier"/>
+                        </a:rPr>
+                        <a:t>: v3}</a:t>
                       </a:r>
                       <a:endParaRPr lang="en-US" sz="1400" dirty="0">
                         <a:latin typeface="Courier"/>
@@ -6492,6 +6682,145 @@
                     <a:p>
                       <a:r>
                         <a:rPr lang="en-US" sz="1400" dirty="0" smtClean="0"/>
+                        <a:t>Instead of random </a:t>
+                      </a:r>
+                      <a:r>
+                        <a:rPr lang="en-US" sz="1400" dirty="0" smtClean="0"/>
+                        <a:t>date,  </a:t>
+                      </a:r>
+                      <a:r>
+                        <a:rPr lang="en-US" sz="1400" dirty="0" smtClean="0"/>
+                        <a:t>start with </a:t>
+                      </a:r>
+                      <a:r>
+                        <a:rPr lang="en-US" sz="1400" dirty="0" smtClean="0"/>
+                        <a:t>string </a:t>
+                      </a:r>
+                      <a:r>
+                        <a:rPr lang="en-US" sz="1400" baseline="0" dirty="0" smtClean="0"/>
+                        <a:t>v2 </a:t>
+                      </a:r>
+                      <a:r>
+                        <a:rPr lang="en-US" sz="1400" baseline="0" dirty="0" smtClean="0"/>
+                        <a:t>and add </a:t>
+                      </a:r>
+                      <a:r>
+                        <a:rPr lang="en-US" sz="1400" baseline="0" dirty="0" smtClean="0"/>
+                        <a:t>some number of </a:t>
+                      </a:r>
+                      <a:r>
+                        <a:rPr lang="en-US" sz="1400" baseline="0" dirty="0" err="1" smtClean="0"/>
+                        <a:t>secs</a:t>
+                      </a:r>
+                      <a:r>
+                        <a:rPr lang="en-US" sz="1400" baseline="0" dirty="0" smtClean="0"/>
+                        <a:t>, </a:t>
+                      </a:r>
+                      <a:r>
+                        <a:rPr lang="en-US" sz="1400" baseline="0" dirty="0" err="1" smtClean="0"/>
+                        <a:t>mins</a:t>
+                      </a:r>
+                      <a:r>
+                        <a:rPr lang="en-US" sz="1400" baseline="0" dirty="0" smtClean="0"/>
+                        <a:t>, </a:t>
+                      </a:r>
+                      <a:r>
+                        <a:rPr lang="en-US" sz="1400" baseline="0" dirty="0" err="1" smtClean="0"/>
+                        <a:t>hrs</a:t>
+                      </a:r>
+                      <a:r>
+                        <a:rPr lang="en-US" sz="1400" baseline="0" dirty="0" smtClean="0"/>
+                        <a:t>, or days v3 </a:t>
+                      </a:r>
+                      <a:r>
+                        <a:rPr lang="en-US" sz="1400" baseline="0" dirty="0" smtClean="0"/>
+                        <a:t>for each successive record.  </a:t>
+                      </a:r>
+                      <a:r>
+                        <a:rPr lang="en-US" sz="1400" baseline="0" dirty="0" smtClean="0"/>
+                        <a:t>v3 </a:t>
+                      </a:r>
+                      <a:r>
+                        <a:rPr lang="en-US" sz="1400" baseline="0" dirty="0" smtClean="0"/>
+                        <a:t>can be negative.  </a:t>
+                      </a:r>
+                      <a:r>
+                        <a:rPr lang="en-US" sz="1400" baseline="0" dirty="0" smtClean="0"/>
+                        <a:t> v2 is any string </a:t>
+                      </a:r>
+                      <a:r>
+                        <a:rPr lang="en-US" sz="1400" baseline="0" dirty="0" err="1" smtClean="0"/>
+                        <a:t>parsable</a:t>
+                      </a:r>
+                      <a:r>
+                        <a:rPr lang="en-US" sz="1400" baseline="0" dirty="0" smtClean="0"/>
+                        <a:t> by </a:t>
+                      </a:r>
+                      <a:r>
+                        <a:rPr lang="en-US" sz="1400" baseline="0" dirty="0" err="1" smtClean="0">
+                          <a:latin typeface="Courier"/>
+                          <a:cs typeface="Courier"/>
+                        </a:rPr>
+                        <a:t>dateutil.parser.parse</a:t>
+                      </a:r>
+                      <a:r>
+                        <a:rPr lang="en-US" sz="1400" baseline="0" dirty="0" smtClean="0">
+                          <a:latin typeface="Courier"/>
+                          <a:cs typeface="Courier"/>
+                        </a:rPr>
+                        <a:t>()</a:t>
+                      </a:r>
+                      <a:endParaRPr lang="en-US" sz="1400" dirty="0">
+                        <a:latin typeface="Courier"/>
+                        <a:cs typeface="Courier"/>
+                      </a:endParaRPr>
+                    </a:p>
+                  </a:txBody>
+                  <a:tcPr/>
+                </a:tc>
+              </a:tr>
+              <a:tr h="370840">
+                <a:tc>
+                  <a:txBody>
+                    <a:bodyPr/>
+                    <a:lstStyle/>
+                    <a:p>
+                      <a:r>
+                        <a:rPr lang="en-US" sz="1400" dirty="0" smtClean="0">
+                          <a:latin typeface="Courier"/>
+                          <a:cs typeface="Courier"/>
+                        </a:rPr>
+                        <a:t>"</a:t>
+                      </a:r>
+                      <a:r>
+                        <a:rPr lang="en-US" sz="1400" dirty="0" err="1" smtClean="0">
+                          <a:latin typeface="Courier"/>
+                          <a:cs typeface="Courier"/>
+                        </a:rPr>
+                        <a:t>pctRandomNull</a:t>
+                      </a:r>
+                      <a:r>
+                        <a:rPr lang="en-US" sz="1400" dirty="0" smtClean="0">
+                          <a:latin typeface="Courier"/>
+                          <a:cs typeface="Courier"/>
+                        </a:rPr>
+                        <a:t>": v</a:t>
+                      </a:r>
+                      <a:endParaRPr lang="en-US" sz="1400" dirty="0">
+                        <a:latin typeface="Courier"/>
+                        <a:cs typeface="Courier"/>
+                      </a:endParaRPr>
+                    </a:p>
+                  </a:txBody>
+                  <a:tcPr/>
+                </a:tc>
+                <a:tc>
+                  <a:txBody>
+                    <a:bodyPr/>
+                    <a:lstStyle/>
+                    <a:p>
+                      <a:r>
+                        <a:rPr lang="en-US" sz="1400" dirty="0" smtClean="0"/>
                         <a:t>“Approximately” v%</a:t>
                       </a:r>
                       <a:r>
@@ -6570,72 +6899,6 @@
                         <a:rPr lang="en-US" sz="1400" baseline="0" dirty="0" smtClean="0"/>
                         <a:t> but semantics being what they are…. “pick one of the children at random.”   Useful for creating polymorphic data.</a:t>
                       </a:r>
-                      <a:endParaRPr lang="en-US" sz="1400" dirty="0"/>
-                    </a:p>
-                  </a:txBody>
-                  <a:tcPr/>
-                </a:tc>
-              </a:tr>
-              <a:tr h="370840">
-                <a:tc>
-                  <a:txBody>
-                    <a:bodyPr/>
-                    <a:lstStyle/>
-                    <a:p>
-                      <a:endParaRPr lang="en-US" dirty="0"/>
-                    </a:p>
-                  </a:txBody>
-                  <a:tcPr/>
-                </a:tc>
-                <a:tc>
-                  <a:txBody>
-                    <a:bodyPr/>
-                    <a:lstStyle/>
-                    <a:p>
-                      <a:endParaRPr lang="en-US" sz="1400" dirty="0"/>
-                    </a:p>
-                  </a:txBody>
-                  <a:tcPr/>
-                </a:tc>
-              </a:tr>
-              <a:tr h="370840">
-                <a:tc>
-                  <a:txBody>
-                    <a:bodyPr/>
-                    <a:lstStyle/>
-                    <a:p>
-                      <a:endParaRPr lang="en-US" dirty="0"/>
-                    </a:p>
-                  </a:txBody>
-                  <a:tcPr/>
-                </a:tc>
-                <a:tc>
-                  <a:txBody>
-                    <a:bodyPr/>
-                    <a:lstStyle/>
-                    <a:p>
-                      <a:endParaRPr lang="en-US" sz="1400" dirty="0"/>
-                    </a:p>
-                  </a:txBody>
-                  <a:tcPr/>
-                </a:tc>
-              </a:tr>
-              <a:tr h="370840">
-                <a:tc>
-                  <a:txBody>
-                    <a:bodyPr/>
-                    <a:lstStyle/>
-                    <a:p>
-                      <a:endParaRPr lang="en-US" dirty="0"/>
-                    </a:p>
-                  </a:txBody>
-                  <a:tcPr/>
-                </a:tc>
-                <a:tc>
-                  <a:txBody>
-                    <a:bodyPr/>
-                    <a:lstStyle/>
-                    <a:p>
                       <a:endParaRPr lang="en-US" sz="1400" dirty="0"/>
                     </a:p>
                   </a:txBody>

</xml_diff>

<commit_message>
Fix up docs, add inc for floats.
</commit_message>
<xml_diff>
--- a/ipsum.pptx
+++ b/ipsum.pptx
@@ -5,10 +5,10 @@
     <p:sldMasterId id="2147483648" r:id="rId1"/>
   </p:sldMasterIdLst>
   <p:notesMasterIdLst>
-    <p:notesMasterId r:id="rId9"/>
+    <p:notesMasterId r:id="rId10"/>
   </p:notesMasterIdLst>
   <p:handoutMasterIdLst>
-    <p:handoutMasterId r:id="rId10"/>
+    <p:handoutMasterId r:id="rId11"/>
   </p:handoutMasterIdLst>
   <p:sldIdLst>
     <p:sldId id="414" r:id="rId2"/>
@@ -18,6 +18,7 @@
     <p:sldId id="417" r:id="rId6"/>
     <p:sldId id="416" r:id="rId7"/>
     <p:sldId id="413" r:id="rId8"/>
+    <p:sldId id="420" r:id="rId9"/>
   </p:sldIdLst>
   <p:sldSz cx="9144000" cy="6858000" type="screen4x3"/>
   <p:notesSz cx="6858000" cy="9144000"/>
@@ -202,7 +203,7 @@
           <a:p>
             <a:fld id="{809650F9-9A3E-EC42-ACF5-9A50B944BD6F}" type="datetimeFigureOut">
               <a:rPr lang="en-US" smtClean="0"/>
-              <a:t>12/11/13</a:t>
+              <a:t>1/15/14</a:t>
             </a:fld>
             <a:endParaRPr lang="en-US"/>
           </a:p>
@@ -367,7 +368,7 @@
           <a:p>
             <a:fld id="{432F3386-1435-B645-8E2D-EAE70419FE1C}" type="datetimeFigureOut">
               <a:rPr lang="en-US" smtClean="0"/>
-              <a:t>12/11/13</a:t>
+              <a:t>1/15/14</a:t>
             </a:fld>
             <a:endParaRPr lang="en-US"/>
           </a:p>
@@ -4089,7 +4090,7 @@
         <p:spPr>
           <a:xfrm>
             <a:off x="945427" y="1117135"/>
-            <a:ext cx="7085889" cy="4370427"/>
+            <a:ext cx="7085889" cy="4678204"/>
           </a:xfrm>
           <a:prstGeom prst="rect">
             <a:avLst/>
@@ -4194,8 +4195,41 @@
               <a:rPr lang="en-US" sz="2000" dirty="0" smtClean="0">
                 <a:cs typeface="Courier"/>
               </a:rPr>
-              <a:t>(IETF spec in draft, v4)</a:t>
-            </a:r>
+              <a:t>(IETF spec in draft, v4</a:t>
+            </a:r>
+            <a:r>
+              <a:rPr lang="en-US" sz="2000" dirty="0" smtClean="0">
+                <a:cs typeface="Courier"/>
+              </a:rPr>
+              <a:t>)</a:t>
+            </a:r>
+          </a:p>
+          <a:p>
+            <a:pPr marL="800100" lvl="1" indent="-342900">
+              <a:buFont typeface="Arial"/>
+              <a:buChar char="•"/>
+            </a:pPr>
+            <a:r>
+              <a:rPr lang="en-US" sz="2000" dirty="0" smtClean="0">
+                <a:cs typeface="Courier"/>
+              </a:rPr>
+              <a:t>Extended with the “</a:t>
+            </a:r>
+            <a:r>
+              <a:rPr lang="en-US" sz="2000" dirty="0" err="1" smtClean="0">
+                <a:cs typeface="Courier"/>
+              </a:rPr>
+              <a:t>ipsum</a:t>
+            </a:r>
+            <a:r>
+              <a:rPr lang="en-US" sz="2000" dirty="0" smtClean="0">
+                <a:cs typeface="Courier"/>
+              </a:rPr>
+              <a:t>” field as peer to “type” </a:t>
+            </a:r>
+            <a:endParaRPr lang="en-US" sz="2000" dirty="0" smtClean="0">
+              <a:cs typeface="Courier"/>
+            </a:endParaRPr>
           </a:p>
           <a:p>
             <a:pPr marL="342900" indent="-342900">
@@ -4585,39 +4619,26 @@
                                   </p:childTnLst>
                                 </p:cTn>
                               </p:par>
+                            </p:childTnLst>
+                          </p:cTn>
+                        </p:par>
+                      </p:childTnLst>
+                    </p:cTn>
+                  </p:par>
+                  <p:par>
+                    <p:cTn id="21" fill="hold">
+                      <p:stCondLst>
+                        <p:cond delay="indefinite"/>
+                      </p:stCondLst>
+                      <p:childTnLst>
+                        <p:par>
+                          <p:cTn id="22" fill="hold">
+                            <p:stCondLst>
+                              <p:cond delay="0"/>
+                            </p:stCondLst>
+                            <p:childTnLst>
                               <p:par>
-                                <p:cTn id="21" presetID="1" presetClass="entr" presetSubtype="0" fill="hold" nodeType="withEffect">
-                                  <p:stCondLst>
-                                    <p:cond delay="0"/>
-                                  </p:stCondLst>
-                                  <p:childTnLst>
-                                    <p:set>
-                                      <p:cBhvr>
-                                        <p:cTn id="22" dur="1" fill="hold">
-                                          <p:stCondLst>
-                                            <p:cond delay="0"/>
-                                          </p:stCondLst>
-                                        </p:cTn>
-                                        <p:tgtEl>
-                                          <p:spTgt spid="23">
-                                            <p:txEl>
-                                              <p:pRg st="5" end="5"/>
-                                            </p:txEl>
-                                          </p:spTgt>
-                                        </p:tgtEl>
-                                        <p:attrNameLst>
-                                          <p:attrName>style.visibility</p:attrName>
-                                        </p:attrNameLst>
-                                      </p:cBhvr>
-                                      <p:to>
-                                        <p:strVal val="visible"/>
-                                      </p:to>
-                                    </p:set>
-                                  </p:childTnLst>
-                                </p:cTn>
-                              </p:par>
-                              <p:par>
-                                <p:cTn id="23" presetID="1" presetClass="entr" presetSubtype="0" fill="hold" nodeType="withEffect">
+                                <p:cTn id="23" presetID="1" presetClass="entr" presetSubtype="0" fill="hold" nodeType="clickEffect">
                                   <p:stCondLst>
                                     <p:cond delay="0"/>
                                   </p:stCondLst>
@@ -4632,7 +4653,7 @@
                                         <p:tgtEl>
                                           <p:spTgt spid="23">
                                             <p:txEl>
-                                              <p:pRg st="6" end="6"/>
+                                              <p:pRg st="5" end="5"/>
                                             </p:txEl>
                                           </p:spTgt>
                                         </p:tgtEl>
@@ -4663,7 +4684,7 @@
                                         <p:tgtEl>
                                           <p:spTgt spid="23">
                                             <p:txEl>
-                                              <p:pRg st="7" end="7"/>
+                                              <p:pRg st="6" end="6"/>
                                             </p:txEl>
                                           </p:spTgt>
                                         </p:tgtEl>
@@ -4694,7 +4715,7 @@
                                         <p:tgtEl>
                                           <p:spTgt spid="23">
                                             <p:txEl>
-                                              <p:pRg st="8" end="8"/>
+                                              <p:pRg st="7" end="7"/>
                                             </p:txEl>
                                           </p:spTgt>
                                         </p:tgtEl>
@@ -4725,6 +4746,37 @@
                                         <p:tgtEl>
                                           <p:spTgt spid="23">
                                             <p:txEl>
+                                              <p:pRg st="8" end="8"/>
+                                            </p:txEl>
+                                          </p:spTgt>
+                                        </p:tgtEl>
+                                        <p:attrNameLst>
+                                          <p:attrName>style.visibility</p:attrName>
+                                        </p:attrNameLst>
+                                      </p:cBhvr>
+                                      <p:to>
+                                        <p:strVal val="visible"/>
+                                      </p:to>
+                                    </p:set>
+                                  </p:childTnLst>
+                                </p:cTn>
+                              </p:par>
+                              <p:par>
+                                <p:cTn id="31" presetID="1" presetClass="entr" presetSubtype="0" fill="hold" nodeType="withEffect">
+                                  <p:stCondLst>
+                                    <p:cond delay="0"/>
+                                  </p:stCondLst>
+                                  <p:childTnLst>
+                                    <p:set>
+                                      <p:cBhvr>
+                                        <p:cTn id="32" dur="1" fill="hold">
+                                          <p:stCondLst>
+                                            <p:cond delay="0"/>
+                                          </p:stCondLst>
+                                        </p:cTn>
+                                        <p:tgtEl>
+                                          <p:spTgt spid="23">
+                                            <p:txEl>
                                               <p:pRg st="9" end="9"/>
                                             </p:txEl>
                                           </p:spTgt>
@@ -4740,26 +4792,8 @@
                                   </p:childTnLst>
                                 </p:cTn>
                               </p:par>
-                            </p:childTnLst>
-                          </p:cTn>
-                        </p:par>
-                      </p:childTnLst>
-                    </p:cTn>
-                  </p:par>
-                  <p:par>
-                    <p:cTn id="31" fill="hold">
-                      <p:stCondLst>
-                        <p:cond delay="indefinite"/>
-                      </p:stCondLst>
-                      <p:childTnLst>
-                        <p:par>
-                          <p:cTn id="32" fill="hold">
-                            <p:stCondLst>
-                              <p:cond delay="0"/>
-                            </p:stCondLst>
-                            <p:childTnLst>
                               <p:par>
-                                <p:cTn id="33" presetID="1" presetClass="entr" presetSubtype="0" fill="hold" nodeType="clickEffect">
+                                <p:cTn id="33" presetID="1" presetClass="entr" presetSubtype="0" fill="hold" nodeType="withEffect">
                                   <p:stCondLst>
                                     <p:cond delay="0"/>
                                   </p:stCondLst>
@@ -4789,15 +4823,33 @@
                                   </p:childTnLst>
                                 </p:cTn>
                               </p:par>
+                            </p:childTnLst>
+                          </p:cTn>
+                        </p:par>
+                      </p:childTnLst>
+                    </p:cTn>
+                  </p:par>
+                  <p:par>
+                    <p:cTn id="35" fill="hold">
+                      <p:stCondLst>
+                        <p:cond delay="indefinite"/>
+                      </p:stCondLst>
+                      <p:childTnLst>
+                        <p:par>
+                          <p:cTn id="36" fill="hold">
+                            <p:stCondLst>
+                              <p:cond delay="0"/>
+                            </p:stCondLst>
+                            <p:childTnLst>
                               <p:par>
-                                <p:cTn id="35" presetID="1" presetClass="entr" presetSubtype="0" fill="hold" nodeType="withEffect">
+                                <p:cTn id="37" presetID="1" presetClass="entr" presetSubtype="0" fill="hold" nodeType="clickEffect">
                                   <p:stCondLst>
                                     <p:cond delay="0"/>
                                   </p:stCondLst>
                                   <p:childTnLst>
                                     <p:set>
                                       <p:cBhvr>
-                                        <p:cTn id="36" dur="1" fill="hold">
+                                        <p:cTn id="38" dur="1" fill="hold">
                                           <p:stCondLst>
                                             <p:cond delay="0"/>
                                           </p:stCondLst>
@@ -4821,14 +4873,14 @@
                                 </p:cTn>
                               </p:par>
                               <p:par>
-                                <p:cTn id="37" presetID="1" presetClass="entr" presetSubtype="0" fill="hold" nodeType="withEffect">
+                                <p:cTn id="39" presetID="1" presetClass="entr" presetSubtype="0" fill="hold" nodeType="withEffect">
                                   <p:stCondLst>
                                     <p:cond delay="0"/>
                                   </p:stCondLst>
                                   <p:childTnLst>
                                     <p:set>
                                       <p:cBhvr>
-                                        <p:cTn id="38" dur="1" fill="hold">
+                                        <p:cTn id="40" dur="1" fill="hold">
                                           <p:stCondLst>
                                             <p:cond delay="0"/>
                                           </p:stCondLst>
@@ -4837,6 +4889,37 @@
                                           <p:spTgt spid="23">
                                             <p:txEl>
                                               <p:pRg st="12" end="12"/>
+                                            </p:txEl>
+                                          </p:spTgt>
+                                        </p:tgtEl>
+                                        <p:attrNameLst>
+                                          <p:attrName>style.visibility</p:attrName>
+                                        </p:attrNameLst>
+                                      </p:cBhvr>
+                                      <p:to>
+                                        <p:strVal val="visible"/>
+                                      </p:to>
+                                    </p:set>
+                                  </p:childTnLst>
+                                </p:cTn>
+                              </p:par>
+                              <p:par>
+                                <p:cTn id="41" presetID="1" presetClass="entr" presetSubtype="0" fill="hold" nodeType="withEffect">
+                                  <p:stCondLst>
+                                    <p:cond delay="0"/>
+                                  </p:stCondLst>
+                                  <p:childTnLst>
+                                    <p:set>
+                                      <p:cBhvr>
+                                        <p:cTn id="42" dur="1" fill="hold">
+                                          <p:stCondLst>
+                                            <p:cond delay="0"/>
+                                          </p:stCondLst>
+                                        </p:cTn>
+                                        <p:tgtEl>
+                                          <p:spTgt spid="23">
+                                            <p:txEl>
+                                              <p:pRg st="13" end="13"/>
                                             </p:txEl>
                                           </p:spTgt>
                                         </p:tgtEl>
@@ -4941,7 +5024,7 @@
         <p:spPr>
           <a:xfrm>
             <a:off x="1604776" y="1272042"/>
-            <a:ext cx="6174616" cy="1938992"/>
+            <a:ext cx="6174616" cy="2123658"/>
           </a:xfrm>
           <a:prstGeom prst="rect">
             <a:avLst/>
@@ -5020,16 +5103,85 @@
                 <a:latin typeface="Courier"/>
                 <a:cs typeface="Courier"/>
               </a:rPr>
-              <a:t>  "properties": {</a:t>
-            </a:r>
-          </a:p>
-          <a:p>
+              <a:t>  "properties": </a:t>
+            </a:r>
             <a:r>
               <a:rPr lang="en-US" sz="1200" dirty="0" smtClean="0">
                 <a:latin typeface="Courier"/>
                 <a:cs typeface="Courier"/>
               </a:rPr>
-              <a:t>    "</a:t>
+              <a:t>{</a:t>
+            </a:r>
+            <a:endParaRPr lang="en-US" sz="1200" dirty="0">
+              <a:latin typeface="Courier"/>
+              <a:cs typeface="Courier"/>
+            </a:endParaRPr>
+          </a:p>
+          <a:p>
+            <a:r>
+              <a:rPr lang="en-US" sz="1200" dirty="0" smtClean="0">
+                <a:latin typeface="Courier"/>
+                <a:cs typeface="Courier"/>
+              </a:rPr>
+              <a:t>  </a:t>
+            </a:r>
+            <a:r>
+              <a:rPr lang="en-US" sz="1200" dirty="0" smtClean="0">
+                <a:latin typeface="Courier"/>
+                <a:cs typeface="Courier"/>
+              </a:rPr>
+              <a:t>  </a:t>
+            </a:r>
+            <a:r>
+              <a:rPr lang="en-US" sz="1200" dirty="0" smtClean="0">
+                <a:latin typeface="Courier"/>
+                <a:cs typeface="Courier"/>
+              </a:rPr>
+              <a:t>"</a:t>
+            </a:r>
+            <a:r>
+              <a:rPr lang="en-US" sz="1200" dirty="0" err="1" smtClean="0">
+                <a:latin typeface="Courier"/>
+                <a:cs typeface="Courier"/>
+              </a:rPr>
+              <a:t>productName</a:t>
+            </a:r>
+            <a:r>
+              <a:rPr lang="en-US" sz="1200" dirty="0" smtClean="0">
+                <a:latin typeface="Courier"/>
+                <a:cs typeface="Courier"/>
+              </a:rPr>
+              <a:t>"</a:t>
+            </a:r>
+            <a:r>
+              <a:rPr lang="en-US" sz="1200" dirty="0">
+                <a:latin typeface="Courier"/>
+                <a:cs typeface="Courier"/>
+              </a:rPr>
+              <a:t>: { "type": "string" }</a:t>
+            </a:r>
+            <a:r>
+              <a:rPr lang="en-US" sz="1200" dirty="0" smtClean="0">
+                <a:latin typeface="Courier"/>
+                <a:cs typeface="Courier"/>
+              </a:rPr>
+              <a:t>,</a:t>
+            </a:r>
+          </a:p>
+          <a:p>
+            <a:r>
+              <a:rPr lang="en-US" sz="1200" dirty="0">
+                <a:latin typeface="Courier"/>
+                <a:cs typeface="Courier"/>
+              </a:rPr>
+              <a:t> </a:t>
+            </a:r>
+            <a:r>
+              <a:rPr lang="en-US" sz="1200" dirty="0" smtClean="0">
+                <a:latin typeface="Courier"/>
+                <a:cs typeface="Courier"/>
+              </a:rPr>
+              <a:t>   "</a:t>
             </a:r>
             <a:r>
               <a:rPr lang="en-US" sz="1200" dirty="0" err="1">
@@ -5043,16 +5195,62 @@
                 <a:latin typeface="Courier"/>
                 <a:cs typeface="Courier"/>
               </a:rPr>
-              <a:t>": { "type": "string" },</a:t>
-            </a:r>
-          </a:p>
-          <a:p>
+              <a:t>": { "type": "</a:t>
+            </a:r>
             <a:r>
               <a:rPr lang="en-US" sz="1200" dirty="0" smtClean="0">
                 <a:latin typeface="Courier"/>
                 <a:cs typeface="Courier"/>
               </a:rPr>
-              <a:t>    "</a:t>
+              <a:t>string”, “</a:t>
+            </a:r>
+            <a:r>
+              <a:rPr lang="en-US" sz="1200" dirty="0" err="1" smtClean="0">
+                <a:latin typeface="Courier"/>
+                <a:cs typeface="Courier"/>
+              </a:rPr>
+              <a:t>ipsum</a:t>
+            </a:r>
+            <a:r>
+              <a:rPr lang="en-US" sz="1200" dirty="0" smtClean="0">
+                <a:latin typeface="Courier"/>
+                <a:cs typeface="Courier"/>
+              </a:rPr>
+              <a:t>”: “sentence” </a:t>
+            </a:r>
+            <a:r>
+              <a:rPr lang="en-US" sz="1200" dirty="0">
+                <a:latin typeface="Courier"/>
+                <a:cs typeface="Courier"/>
+              </a:rPr>
+              <a:t>}</a:t>
+            </a:r>
+            <a:r>
+              <a:rPr lang="en-US" sz="1200" dirty="0" smtClean="0">
+                <a:latin typeface="Courier"/>
+                <a:cs typeface="Courier"/>
+              </a:rPr>
+              <a:t>,</a:t>
+            </a:r>
+            <a:endParaRPr lang="en-US" sz="1200" dirty="0" smtClean="0">
+              <a:latin typeface="Courier"/>
+              <a:cs typeface="Courier"/>
+            </a:endParaRPr>
+          </a:p>
+          <a:p>
+            <a:r>
+              <a:rPr lang="en-US" sz="1200" dirty="0" smtClean="0">
+                <a:latin typeface="Courier"/>
+                <a:cs typeface="Courier"/>
+              </a:rPr>
+              <a:t>    </a:t>
+            </a:r>
+            <a:r>
+              <a:rPr lang="en-US" sz="1200" dirty="0" smtClean="0">
+                <a:latin typeface="Courier"/>
+                <a:cs typeface="Courier"/>
+              </a:rPr>
+              <a:t>"</a:t>
             </a:r>
             <a:r>
               <a:rPr lang="en-US" sz="1200" dirty="0" err="1">
@@ -5066,15 +5264,26 @@
                 <a:latin typeface="Courier"/>
                 <a:cs typeface="Courier"/>
               </a:rPr>
-              <a:t>": { "type": "string", "format": "date-time" }</a:t>
-            </a:r>
-          </a:p>
-          <a:p>
+              <a:t>": { "type": "string", "format": "date-time" </a:t>
+            </a:r>
             <a:r>
               <a:rPr lang="en-US" sz="1200" dirty="0" smtClean="0">
                 <a:latin typeface="Courier"/>
                 <a:cs typeface="Courier"/>
               </a:rPr>
+              <a:t>},</a:t>
+            </a:r>
+            <a:endParaRPr lang="en-US" sz="1200" dirty="0">
+              <a:latin typeface="Courier"/>
+              <a:cs typeface="Courier"/>
+            </a:endParaRPr>
+          </a:p>
+          <a:p>
+            <a:r>
+              <a:rPr lang="en-US" sz="1200" dirty="0" smtClean="0">
+                <a:latin typeface="Courier"/>
+                <a:cs typeface="Courier"/>
+              </a:rPr>
               <a:t>    "</a:t>
             </a:r>
             <a:r>
@@ -5117,8 +5326,19 @@
                 <a:latin typeface="Courier"/>
                 <a:cs typeface="Courier"/>
               </a:rPr>
-              <a:t>": "id" },</a:t>
-            </a:r>
+              <a:t>": "id" </a:t>
+            </a:r>
+            <a:r>
+              <a:rPr lang="en-US" sz="1200" dirty="0" smtClean="0">
+                <a:latin typeface="Courier"/>
+                <a:cs typeface="Courier"/>
+              </a:rPr>
+              <a:t>}</a:t>
+            </a:r>
+            <a:endParaRPr lang="en-US" sz="1200" dirty="0">
+              <a:latin typeface="Courier"/>
+              <a:cs typeface="Courier"/>
+            </a:endParaRPr>
           </a:p>
           <a:p>
             <a:r>
@@ -5156,7 +5376,7 @@
         <p:spPr>
           <a:xfrm>
             <a:off x="628403" y="3626384"/>
-            <a:ext cx="7771740" cy="2400657"/>
+            <a:ext cx="7771740" cy="2031325"/>
           </a:xfrm>
           <a:prstGeom prst="rect">
             <a:avLst/>
@@ -5195,8 +5415,26 @@
                 <a:latin typeface="Courier"/>
                 <a:cs typeface="Courier"/>
               </a:rPr>
-              <a:t> --count 2 hello2.jsch </a:t>
-            </a:r>
+              <a:t> --count 2 </a:t>
+            </a:r>
+            <a:r>
+              <a:rPr lang="en-US" sz="1200" dirty="0" err="1" smtClean="0">
+                <a:latin typeface="Courier"/>
+                <a:cs typeface="Courier"/>
+              </a:rPr>
+              <a:t>hello.jsch</a:t>
+            </a:r>
+            <a:r>
+              <a:rPr lang="en-US" sz="1200" dirty="0" smtClean="0">
+                <a:latin typeface="Courier"/>
+                <a:cs typeface="Courier"/>
+              </a:rPr>
+              <a:t> </a:t>
+            </a:r>
+            <a:endParaRPr lang="en-US" sz="1200" dirty="0">
+              <a:latin typeface="Courier"/>
+              <a:cs typeface="Courier"/>
+            </a:endParaRPr>
           </a:p>
           <a:p>
             <a:r>
@@ -5218,35 +5456,35 @@
                 <a:latin typeface="Courier"/>
                 <a:cs typeface="Courier"/>
               </a:rPr>
-              <a:t>": {"$date": 634246901}, "</a:t>
+              <a:t>": {"$date": 1057980788}, "</a:t>
             </a:r>
             <a:r>
               <a:rPr lang="en-US" sz="1200" dirty="0" err="1">
                 <a:latin typeface="Courier"/>
                 <a:cs typeface="Courier"/>
               </a:rPr>
-              <a:t>productDesc</a:t>
+              <a:t>productName</a:t>
             </a:r>
             <a:r>
               <a:rPr lang="en-US" sz="1200" dirty="0">
                 <a:latin typeface="Courier"/>
                 <a:cs typeface="Courier"/>
               </a:rPr>
-              <a:t>": "mainland original their mainland making linguistically </a:t>
+              <a:t>": "reach", "</a:t>
             </a:r>
             <a:r>
               <a:rPr lang="en-US" sz="1200" dirty="0" err="1">
                 <a:latin typeface="Courier"/>
                 <a:cs typeface="Courier"/>
               </a:rPr>
-              <a:t>languageThe</a:t>
+              <a:t>productDesc</a:t>
             </a:r>
             <a:r>
               <a:rPr lang="en-US" sz="1200" dirty="0">
                 <a:latin typeface="Courier"/>
                 <a:cs typeface="Courier"/>
               </a:rPr>
-              <a:t> municipality renamed or with more nearby with largest named with largest", "</a:t>
+              <a:t>": "was nearby to of square the municipality largest", "</a:t>
             </a:r>
             <a:r>
               <a:rPr lang="en-US" sz="1200" dirty="0" err="1">
@@ -5260,7 +5498,7 @@
                 <a:latin typeface="Courier"/>
                 <a:cs typeface="Courier"/>
               </a:rPr>
-              <a:t>": "24d58ecf-7163-420e-b6fd-7320b732431a"}</a:t>
+              <a:t>": "902845d5-3a98-4a64-92d8-3ccaf98101ff"}</a:t>
             </a:r>
           </a:p>
           <a:p>
@@ -5283,85 +5521,56 @@
                 <a:latin typeface="Courier"/>
                 <a:cs typeface="Courier"/>
               </a:rPr>
-              <a:t>": {"$date": 1382329757}, "</a:t>
+              <a:t>": {"$date": 745165922}, "</a:t>
             </a:r>
             <a:r>
               <a:rPr lang="en-US" sz="1200" dirty="0" err="1">
                 <a:latin typeface="Courier"/>
                 <a:cs typeface="Courier"/>
               </a:rPr>
-              <a:t>productDesc</a:t>
+              <a:t>productName</a:t>
             </a:r>
             <a:r>
               <a:rPr lang="en-US" sz="1200" dirty="0">
                 <a:latin typeface="Courier"/>
                 <a:cs typeface="Courier"/>
               </a:rPr>
-              <a:t>": "</a:t>
+              <a:t>": "populated", "</a:t>
             </a:r>
             <a:r>
               <a:rPr lang="en-US" sz="1200" dirty="0" err="1">
                 <a:latin typeface="Courier"/>
                 <a:cs typeface="Courier"/>
               </a:rPr>
-              <a:t>townsite</a:t>
+              <a:t>productDesc</a:t>
             </a:r>
             <a:r>
               <a:rPr lang="en-US" sz="1200" dirty="0">
                 <a:latin typeface="Courier"/>
                 <a:cs typeface="Courier"/>
               </a:rPr>
-              <a:t> speak would was on most named original of seaport those logging reach square mainland one mainland metropolitan most their than the with would with </a:t>
+              <a:t>": "more than million or named per populous seaport was", "</a:t>
             </a:r>
             <a:r>
               <a:rPr lang="en-US" sz="1200" dirty="0" err="1">
                 <a:latin typeface="Courier"/>
                 <a:cs typeface="Courier"/>
               </a:rPr>
-              <a:t>townsite</a:t>
+              <a:t>productID</a:t>
             </a:r>
             <a:r>
               <a:rPr lang="en-US" sz="1200" dirty="0">
                 <a:latin typeface="Courier"/>
                 <a:cs typeface="Courier"/>
               </a:rPr>
-              <a:t> per railway third mile) logging railhead transcontinental largest </a:t>
-            </a:r>
-            <a:r>
-              <a:rPr lang="en-US" sz="1200" dirty="0" err="1">
-                <a:latin typeface="Courier"/>
-                <a:cs typeface="Courier"/>
-              </a:rPr>
-              <a:t>languageThe</a:t>
-            </a:r>
-            <a:r>
-              <a:rPr lang="en-US" sz="1200" dirty="0">
-                <a:latin typeface="Courier"/>
-                <a:cs typeface="Courier"/>
-              </a:rPr>
-              <a:t> recorded that to settlement not sawmill mainland on", "</a:t>
-            </a:r>
-            <a:r>
-              <a:rPr lang="en-US" sz="1200" dirty="0" err="1">
-                <a:latin typeface="Courier"/>
-                <a:cs typeface="Courier"/>
-              </a:rPr>
-              <a:t>productID</a:t>
-            </a:r>
-            <a:r>
-              <a:rPr lang="en-US" sz="1200" dirty="0">
-                <a:latin typeface="Courier"/>
-                <a:cs typeface="Courier"/>
-              </a:rPr>
-              <a:t>": "5aa0b6c8-47e1-4436-88c8-</a:t>
-            </a:r>
-            <a:r>
-              <a:rPr lang="en-US" sz="1200" dirty="0" smtClean="0">
-                <a:latin typeface="Courier"/>
-                <a:cs typeface="Courier"/>
-              </a:rPr>
-              <a:t>7684d8aac3ff”}</a:t>
-            </a:r>
+              <a:t>": "5982007a-ffcf-4d89-9e95-ba9cb57931b2"}</a:t>
+            </a:r>
+          </a:p>
+          <a:p>
+            <a:endParaRPr lang="en-US" sz="1200" dirty="0">
+              <a:latin typeface="Courier"/>
+              <a:cs typeface="Courier"/>
+            </a:endParaRPr>
           </a:p>
           <a:p>
             <a:endParaRPr lang="en-US" sz="1200" dirty="0">
@@ -6230,23 +6439,11 @@
                     <a:p>
                       <a:r>
                         <a:rPr lang="en-US" sz="1400" dirty="0" smtClean="0"/>
-                        <a:t>(array type) </a:t>
-                      </a:r>
-                      <a:r>
-                        <a:rPr lang="en-US" sz="1400" dirty="0" smtClean="0"/>
-                        <a:t>Largest </a:t>
+                        <a:t>(array type) Largest </a:t>
                       </a:r>
                       <a:r>
                         <a:rPr lang="en-US" sz="1400" baseline="0" dirty="0" smtClean="0"/>
-                        <a:t>number </a:t>
-                      </a:r>
-                      <a:r>
-                        <a:rPr lang="en-US" sz="1400" baseline="0" dirty="0" smtClean="0"/>
-                        <a:t>of items to put in an array (default is </a:t>
-                      </a:r>
-                      <a:r>
-                        <a:rPr lang="en-US" sz="1400" baseline="0" dirty="0" smtClean="0"/>
-                        <a:t>4)</a:t>
+                        <a:t>number of items to put in an array (default is 4)</a:t>
                       </a:r>
                       <a:endParaRPr lang="en-US" sz="1400" dirty="0"/>
                     </a:p>
@@ -6412,12 +6609,20 @@
           <a:lstStyle/>
           <a:p>
             <a:r>
+              <a:rPr lang="en-US" dirty="0" smtClean="0"/>
+              <a:t>Cool new </a:t>
+            </a:r>
+            <a:r>
               <a:rPr lang="en-US" dirty="0" err="1" smtClean="0"/>
               <a:t>ipsum</a:t>
             </a:r>
             <a:r>
               <a:rPr lang="en-US" dirty="0" smtClean="0"/>
-              <a:t> features</a:t>
+              <a:t> </a:t>
+            </a:r>
+            <a:r>
+              <a:rPr lang="en-US" dirty="0" smtClean="0"/>
+              <a:t>features</a:t>
             </a:r>
             <a:endParaRPr lang="en-US" dirty="0"/>
           </a:p>
@@ -6432,14 +6637,14 @@
           <p:nvPr>
             <p:extLst>
               <p:ext uri="{D42A27DB-BD31-4B8C-83A1-F6EECF244321}">
-                <p14:modId xmlns:p14="http://schemas.microsoft.com/office/powerpoint/2010/main" val="3948730683"/>
+                <p14:modId xmlns:p14="http://schemas.microsoft.com/office/powerpoint/2010/main" val="2466665553"/>
               </p:ext>
             </p:extLst>
           </p:nvPr>
         </p:nvGraphicFramePr>
         <p:xfrm>
-          <a:off x="825500" y="1397000"/>
-          <a:ext cx="7275286" cy="3510279"/>
+          <a:off x="825500" y="1219380"/>
+          <a:ext cx="7275286" cy="4613263"/>
         </p:xfrm>
         <a:graphic>
           <a:graphicData uri="http://schemas.openxmlformats.org/drawingml/2006/table">
@@ -6481,7 +6686,7 @@
                   <a:tcPr/>
                 </a:tc>
               </a:tr>
-              <a:tr h="370840">
+              <a:tr h="1020651">
                 <a:tc>
                   <a:txBody>
                     <a:bodyPr/>
@@ -6492,10 +6697,15 @@
                           <a:latin typeface="Courier"/>
                           <a:cs typeface="Courier"/>
                         </a:rPr>
-                        <a:t>"type": "integer",</a:t>
-                      </a:r>
-                    </a:p>
-                    <a:p>
+                        <a:t>"type": "</a:t>
+                      </a:r>
+                      <a:r>
+                        <a:rPr lang="nl-NL" sz="1400" dirty="0" err="1" smtClean="0">
+                          <a:latin typeface="Courier"/>
+                          <a:cs typeface="Courier"/>
+                        </a:rPr>
+                        <a:t>integer|number</a:t>
+                      </a:r>
                       <a:r>
                         <a:rPr lang="nl-NL" sz="1400" dirty="0" smtClean="0">
                           <a:latin typeface="Courier"/>
@@ -6504,6 +6714,22 @@
                         <a:t>"</a:t>
                       </a:r>
                       <a:r>
+                        <a:rPr lang="nl-NL" sz="1400" dirty="0" smtClean="0">
+                          <a:latin typeface="Courier"/>
+                          <a:cs typeface="Courier"/>
+                        </a:rPr>
+                        <a:t>,</a:t>
+                      </a:r>
+                    </a:p>
+                    <a:p>
+                      <a:r>
+                        <a:rPr lang="nl-NL" sz="1400" dirty="0" smtClean="0">
+                          <a:latin typeface="Courier"/>
+                          <a:cs typeface="Courier"/>
+                        </a:rPr>
+                        <a:t>"</a:t>
+                      </a:r>
+                      <a:r>
                         <a:rPr lang="nl-NL" sz="1400" dirty="0" err="1" smtClean="0">
                           <a:latin typeface="Courier"/>
                           <a:cs typeface="Courier"/>
@@ -6529,14 +6755,7 @@
                           <a:latin typeface="Courier"/>
                           <a:cs typeface="Courier"/>
                         </a:rPr>
-                        <a:t>": </a:t>
-                      </a:r>
-                      <a:r>
-                        <a:rPr lang="nl-NL" sz="1400" dirty="0" smtClean="0">
-                          <a:latin typeface="Courier"/>
-                          <a:cs typeface="Courier"/>
-                        </a:rPr>
-                        <a:t>{”start”: v2, “val”: v3}</a:t>
+                        <a:t>": {”start”: v2, “val”: v3}</a:t>
                       </a:r>
                       <a:endParaRPr lang="en-US" sz="1400" dirty="0">
                         <a:latin typeface="Courier"/>
@@ -6561,11 +6780,11 @@
                       </a:r>
                       <a:r>
                         <a:rPr lang="en-US" sz="1400" dirty="0" smtClean="0"/>
-                        <a:t>, </a:t>
+                        <a:t> or float,  </a:t>
                       </a:r>
                       <a:r>
                         <a:rPr lang="en-US" sz="1400" dirty="0" smtClean="0"/>
-                        <a:t> start with value</a:t>
+                        <a:t>start with value</a:t>
                       </a:r>
                       <a:r>
                         <a:rPr lang="en-US" sz="1400" baseline="0" dirty="0" smtClean="0"/>
@@ -6573,15 +6792,19 @@
                       </a:r>
                       <a:r>
                         <a:rPr lang="en-US" sz="1400" dirty="0" smtClean="0"/>
-                        <a:t>seful </a:t>
-                      </a:r>
-                      <a:r>
-                        <a:rPr lang="en-US" sz="1400" dirty="0" smtClean="0"/>
-                        <a:t>for creating</a:t>
+                        <a:t>seful for creating</a:t>
                       </a:r>
                       <a:r>
                         <a:rPr lang="en-US" sz="1400" baseline="0" dirty="0" smtClean="0"/>
-                        <a:t> things like message sequential numbers.  </a:t>
+                        <a:t> things like message </a:t>
+                      </a:r>
+                      <a:r>
+                        <a:rPr lang="en-US" sz="1400" baseline="0" dirty="0" smtClean="0"/>
+                        <a:t>sequence numbers</a:t>
+                      </a:r>
+                      <a:r>
+                        <a:rPr lang="en-US" sz="1400" baseline="0" dirty="0" smtClean="0"/>
+                        <a:t>.  </a:t>
                       </a:r>
                       <a:endParaRPr lang="en-US" sz="1400" dirty="0"/>
                     </a:p>
@@ -6589,7 +6812,7 @@
                   <a:tcPr/>
                 </a:tc>
               </a:tr>
-              <a:tr h="370840">
+              <a:tr h="1247203">
                 <a:tc>
                   <a:txBody>
                     <a:bodyPr/>
@@ -6637,14 +6860,7 @@
                           <a:latin typeface="Courier"/>
                           <a:cs typeface="Courier"/>
                         </a:rPr>
-                        <a:t>": {”start”: v2, </a:t>
-                      </a:r>
-                      <a:r>
-                        <a:rPr lang="nl-NL" sz="1400" dirty="0" smtClean="0">
-                          <a:latin typeface="Courier"/>
-                          <a:cs typeface="Courier"/>
-                        </a:rPr>
-                        <a:t>“</a:t>
+                        <a:t>": {”start”: v2, “</a:t>
                       </a:r>
                       <a:r>
                         <a:rPr lang="nl-NL" sz="1400" dirty="0" err="1" smtClean="0">
@@ -6658,14 +6874,7 @@
                           <a:latin typeface="Courier"/>
                           <a:cs typeface="Courier"/>
                         </a:rPr>
-                        <a:t>”</a:t>
-                      </a:r>
-                      <a:r>
-                        <a:rPr lang="nl-NL" sz="1400" dirty="0" smtClean="0">
-                          <a:latin typeface="Courier"/>
-                          <a:cs typeface="Courier"/>
-                        </a:rPr>
-                        <a:t>: v3}</a:t>
+                        <a:t>”: v3}</a:t>
                       </a:r>
                       <a:endParaRPr lang="en-US" sz="1400" dirty="0">
                         <a:latin typeface="Courier"/>
@@ -6682,31 +6891,11 @@
                     <a:p>
                       <a:r>
                         <a:rPr lang="en-US" sz="1400" dirty="0" smtClean="0"/>
-                        <a:t>Instead of random </a:t>
-                      </a:r>
-                      <a:r>
-                        <a:rPr lang="en-US" sz="1400" dirty="0" smtClean="0"/>
-                        <a:t>date,  </a:t>
-                      </a:r>
-                      <a:r>
-                        <a:rPr lang="en-US" sz="1400" dirty="0" smtClean="0"/>
-                        <a:t>start with </a:t>
-                      </a:r>
-                      <a:r>
-                        <a:rPr lang="en-US" sz="1400" dirty="0" smtClean="0"/>
-                        <a:t>string </a:t>
+                        <a:t>Instead of random date,  start with string </a:t>
                       </a:r>
                       <a:r>
                         <a:rPr lang="en-US" sz="1400" baseline="0" dirty="0" smtClean="0"/>
-                        <a:t>v2 </a:t>
-                      </a:r>
-                      <a:r>
-                        <a:rPr lang="en-US" sz="1400" baseline="0" dirty="0" smtClean="0"/>
-                        <a:t>and add </a:t>
-                      </a:r>
-                      <a:r>
-                        <a:rPr lang="en-US" sz="1400" baseline="0" dirty="0" smtClean="0"/>
-                        <a:t>some number of </a:t>
+                        <a:t>v2 and add some number of </a:t>
                       </a:r>
                       <a:r>
                         <a:rPr lang="en-US" sz="1400" baseline="0" dirty="0" err="1" smtClean="0"/>
@@ -6730,23 +6919,7 @@
                       </a:r>
                       <a:r>
                         <a:rPr lang="en-US" sz="1400" baseline="0" dirty="0" smtClean="0"/>
-                        <a:t>, or days v3 </a:t>
-                      </a:r>
-                      <a:r>
-                        <a:rPr lang="en-US" sz="1400" baseline="0" dirty="0" smtClean="0"/>
-                        <a:t>for each successive record.  </a:t>
-                      </a:r>
-                      <a:r>
-                        <a:rPr lang="en-US" sz="1400" baseline="0" dirty="0" smtClean="0"/>
-                        <a:t>v3 </a:t>
-                      </a:r>
-                      <a:r>
-                        <a:rPr lang="en-US" sz="1400" baseline="0" dirty="0" smtClean="0"/>
-                        <a:t>can be negative.  </a:t>
-                      </a:r>
-                      <a:r>
-                        <a:rPr lang="en-US" sz="1400" baseline="0" dirty="0" smtClean="0"/>
-                        <a:t> v2 is any string </a:t>
+                        <a:t>, or days v3 for each successive record.  v3 can be negative.   v2 is any string </a:t>
                       </a:r>
                       <a:r>
                         <a:rPr lang="en-US" sz="1400" baseline="0" dirty="0" err="1" smtClean="0"/>
@@ -6779,7 +6952,7 @@
                   <a:tcPr/>
                 </a:tc>
               </a:tr>
-              <a:tr h="370840">
+              <a:tr h="728205">
                 <a:tc>
                   <a:txBody>
                     <a:bodyPr/>
@@ -6790,6 +6963,15 @@
                           <a:latin typeface="Courier"/>
                           <a:cs typeface="Courier"/>
                         </a:rPr>
+                        <a:t>"type": "string",</a:t>
+                      </a:r>
+                    </a:p>
+                    <a:p>
+                      <a:r>
+                        <a:rPr lang="en-US" sz="1400" dirty="0" smtClean="0">
+                          <a:latin typeface="Courier"/>
+                          <a:cs typeface="Courier"/>
+                        </a:rPr>
                         <a:t>"</a:t>
                       </a:r>
                       <a:r>
@@ -6797,14 +6979,28 @@
                           <a:latin typeface="Courier"/>
                           <a:cs typeface="Courier"/>
                         </a:rPr>
-                        <a:t>pctRandomNull</a:t>
+                        <a:t>ipsum</a:t>
                       </a:r>
                       <a:r>
                         <a:rPr lang="en-US" sz="1400" dirty="0" smtClean="0">
                           <a:latin typeface="Courier"/>
                           <a:cs typeface="Courier"/>
                         </a:rPr>
-                        <a:t>": v</a:t>
+                        <a:t>": "</a:t>
+                      </a:r>
+                      <a:r>
+                        <a:rPr lang="en-US" sz="1400" dirty="0" err="1" smtClean="0">
+                          <a:latin typeface="Courier"/>
+                          <a:cs typeface="Courier"/>
+                        </a:rPr>
+                        <a:t>bson:ObjectId</a:t>
+                      </a:r>
+                      <a:r>
+                        <a:rPr lang="en-US" sz="1400" dirty="0" smtClean="0">
+                          <a:latin typeface="Courier"/>
+                          <a:cs typeface="Courier"/>
+                        </a:rPr>
+                        <a:t>"</a:t>
                       </a:r>
                       <a:endParaRPr lang="en-US" sz="1400" dirty="0">
                         <a:latin typeface="Courier"/>
@@ -6821,6 +7017,89 @@
                     <a:p>
                       <a:r>
                         <a:rPr lang="en-US" sz="1400" dirty="0" smtClean="0"/>
+                        <a:t>Generate valid unique </a:t>
+                      </a:r>
+                      <a:r>
+                        <a:rPr lang="en-US" sz="1400" dirty="0" err="1" smtClean="0"/>
+                        <a:t>ObjectIds</a:t>
+                      </a:r>
+                      <a:r>
+                        <a:rPr lang="en-US" sz="1400" dirty="0" smtClean="0"/>
+                        <a:t> </a:t>
+                      </a:r>
+                      <a:r>
+                        <a:rPr lang="en-US" sz="1400" dirty="0" err="1" smtClean="0"/>
+                        <a:t>ala</a:t>
+                      </a:r>
+                      <a:r>
+                        <a:rPr lang="en-US" sz="1400" dirty="0" smtClean="0"/>
+                        <a:t> </a:t>
+                      </a:r>
+                    </a:p>
+                    <a:p>
+                      <a:r>
+                        <a:rPr lang="fi-FI" sz="1400" baseline="0" dirty="0" smtClean="0"/>
+                        <a:t>{"$</a:t>
+                      </a:r>
+                      <a:r>
+                        <a:rPr lang="fi-FI" sz="1400" baseline="0" dirty="0" err="1" smtClean="0"/>
+                        <a:t>oid</a:t>
+                      </a:r>
+                      <a:r>
+                        <a:rPr lang="fi-FI" sz="1400" baseline="0" dirty="0" smtClean="0"/>
+                        <a:t>": "52d6c77b4142435025d7c563"}</a:t>
+                      </a:r>
+                      <a:endParaRPr lang="en-US" sz="1400" dirty="0">
+                        <a:latin typeface="Courier"/>
+                        <a:cs typeface="Courier"/>
+                      </a:endParaRPr>
+                    </a:p>
+                  </a:txBody>
+                  <a:tcPr/>
+                </a:tc>
+              </a:tr>
+              <a:tr h="728205">
+                <a:tc>
+                  <a:txBody>
+                    <a:bodyPr/>
+                    <a:lstStyle/>
+                    <a:p>
+                      <a:r>
+                        <a:rPr lang="en-US" sz="1400" dirty="0" smtClean="0">
+                          <a:latin typeface="Courier"/>
+                          <a:cs typeface="Courier"/>
+                        </a:rPr>
+                        <a:t>"</a:t>
+                      </a:r>
+                      <a:r>
+                        <a:rPr lang="en-US" sz="1400" dirty="0" err="1" smtClean="0">
+                          <a:latin typeface="Courier"/>
+                          <a:cs typeface="Courier"/>
+                        </a:rPr>
+                        <a:t>pctRandomNull</a:t>
+                      </a:r>
+                      <a:r>
+                        <a:rPr lang="en-US" sz="1400" dirty="0" smtClean="0">
+                          <a:latin typeface="Courier"/>
+                          <a:cs typeface="Courier"/>
+                        </a:rPr>
+                        <a:t>": v</a:t>
+                      </a:r>
+                      <a:endParaRPr lang="en-US" sz="1400" dirty="0">
+                        <a:latin typeface="Courier"/>
+                        <a:cs typeface="Courier"/>
+                      </a:endParaRPr>
+                    </a:p>
+                  </a:txBody>
+                  <a:tcPr/>
+                </a:tc>
+                <a:tc>
+                  <a:txBody>
+                    <a:bodyPr/>
+                    <a:lstStyle/>
+                    <a:p>
+                      <a:r>
+                        <a:rPr lang="en-US" sz="1400" dirty="0" smtClean="0"/>
                         <a:t>“Approximately” v%</a:t>
                       </a:r>
                       <a:r>
@@ -6844,7 +7123,35 @@
                           <a:latin typeface="Courier"/>
                           <a:cs typeface="Courier"/>
                         </a:rPr>
-                        <a:t>"type": "poly",</a:t>
+                        <a:t>"type": </a:t>
+                      </a:r>
+                      <a:r>
+                        <a:rPr lang="en-US" sz="1400" dirty="0" smtClean="0">
+                          <a:latin typeface="Courier"/>
+                          <a:cs typeface="Courier"/>
+                        </a:rPr>
+                        <a:t>”</a:t>
+                      </a:r>
+                      <a:r>
+                        <a:rPr lang="en-US" sz="1400" dirty="0" err="1" smtClean="0">
+                          <a:latin typeface="Courier"/>
+                          <a:cs typeface="Courier"/>
+                        </a:rPr>
+                        <a:t>oneOf</a:t>
+                      </a:r>
+                      <a:r>
+                        <a:rPr lang="en-US" sz="1400" dirty="0" smtClean="0">
+                          <a:latin typeface="Courier"/>
+                          <a:cs typeface="Courier"/>
+                        </a:rPr>
+                        <a:t>"</a:t>
+                      </a:r>
+                      <a:r>
+                        <a:rPr lang="en-US" sz="1400" dirty="0" smtClean="0">
+                          <a:latin typeface="Courier"/>
+                          <a:cs typeface="Courier"/>
+                        </a:rPr>
+                        <a:t>,</a:t>
                       </a:r>
                     </a:p>
                     <a:p>
@@ -6877,27 +7184,31 @@
                     <a:p>
                       <a:r>
                         <a:rPr lang="en-US" sz="1400" dirty="0" smtClean="0"/>
-                        <a:t>A new (stealth) type.</a:t>
+                        <a:t>P</a:t>
                       </a:r>
                       <a:r>
                         <a:rPr lang="en-US" sz="1400" baseline="0" dirty="0" smtClean="0"/>
-                        <a:t>   Similar in objective to </a:t>
-                      </a:r>
-                      <a:r>
-                        <a:rPr lang="en-US" sz="1400" baseline="0" dirty="0" err="1" smtClean="0"/>
-                        <a:t>oneOf</a:t>
+                        <a:t>icks </a:t>
                       </a:r>
                       <a:r>
                         <a:rPr lang="en-US" sz="1400" baseline="0" dirty="0" smtClean="0"/>
-                        <a:t> or </a:t>
-                      </a:r>
-                      <a:r>
-                        <a:rPr lang="en-US" sz="1400" baseline="0" dirty="0" err="1" smtClean="0"/>
-                        <a:t>anyOf</a:t>
+                        <a:t>one of the children </a:t>
                       </a:r>
                       <a:r>
                         <a:rPr lang="en-US" sz="1400" baseline="0" dirty="0" smtClean="0"/>
-                        <a:t> but semantics being what they are…. “pick one of the children at random.”   Useful for creating polymorphic data.</a:t>
+                        <a:t>schemas at </a:t>
+                      </a:r>
+                      <a:r>
+                        <a:rPr lang="en-US" sz="1400" baseline="0" dirty="0" smtClean="0"/>
+                        <a:t>random</a:t>
+                      </a:r>
+                      <a:r>
+                        <a:rPr lang="en-US" sz="1400" baseline="0" dirty="0" smtClean="0"/>
+                        <a:t>.  Very useful for </a:t>
+                      </a:r>
+                      <a:r>
+                        <a:rPr lang="en-US" sz="1400" baseline="0" dirty="0" smtClean="0"/>
+                        <a:t>creating polymorphic data.</a:t>
                       </a:r>
                       <a:endParaRPr lang="en-US" sz="1400" dirty="0"/>
                     </a:p>
@@ -6964,8 +7275,16 @@
           <a:lstStyle/>
           <a:p>
             <a:r>
+              <a:rPr lang="en-US" dirty="0"/>
+              <a:t>B</a:t>
+            </a:r>
+            <a:r>
               <a:rPr lang="en-US" dirty="0" smtClean="0"/>
-              <a:t>Even-More-Extended JSON</a:t>
+              <a:t>onus: Even</a:t>
+            </a:r>
+            <a:r>
+              <a:rPr lang="en-US" dirty="0" smtClean="0"/>
+              <a:t>-More-Extended JSON</a:t>
             </a:r>
             <a:endParaRPr lang="en-US" dirty="0"/>
           </a:p>
@@ -7185,8 +7504,40 @@
                 <a:latin typeface="Courier"/>
                 <a:cs typeface="Courier"/>
               </a:rPr>
-              <a:t>{“$long”: 15}</a:t>
-            </a:r>
+              <a:t>{“$long”: 15</a:t>
+            </a:r>
+            <a:r>
+              <a:rPr lang="en-US" sz="1400" dirty="0" smtClean="0">
+                <a:latin typeface="Courier"/>
+                <a:cs typeface="Courier"/>
+              </a:rPr>
+              <a:t>}     </a:t>
+            </a:r>
+            <a:r>
+              <a:rPr lang="en-US" sz="1000" dirty="0" smtClean="0">
+                <a:latin typeface="Courier"/>
+                <a:cs typeface="Courier"/>
+              </a:rPr>
+              <a:t>15-Jan-2014: just discovered 2.5.x emits $</a:t>
+            </a:r>
+            <a:r>
+              <a:rPr lang="en-US" sz="1000" dirty="0" err="1" smtClean="0">
+                <a:latin typeface="Courier"/>
+                <a:cs typeface="Courier"/>
+              </a:rPr>
+              <a:t>numberLong</a:t>
+            </a:r>
+            <a:r>
+              <a:rPr lang="en-US" sz="1000" dirty="0" smtClean="0">
+                <a:latin typeface="Courier"/>
+                <a:cs typeface="Courier"/>
+              </a:rPr>
+              <a:t>!</a:t>
+            </a:r>
+            <a:endParaRPr lang="en-US" sz="1000" dirty="0" smtClean="0">
+              <a:latin typeface="Courier"/>
+              <a:cs typeface="Courier"/>
+            </a:endParaRPr>
           </a:p>
           <a:p>
             <a:r>
@@ -8037,6 +8388,168 @@
     <p:extLst>
       <p:ext uri="{BB962C8B-B14F-4D97-AF65-F5344CB8AC3E}">
         <p14:creationId xmlns:p14="http://schemas.microsoft.com/office/powerpoint/2010/main" val="2423438533"/>
+      </p:ext>
+    </p:extLst>
+  </p:cSld>
+  <p:clrMapOvr>
+    <a:masterClrMapping/>
+  </p:clrMapOvr>
+  <p:timing>
+    <p:tnLst>
+      <p:par>
+        <p:cTn xmlns:p14="http://schemas.microsoft.com/office/powerpoint/2010/main" id="1" dur="indefinite" restart="never" nodeType="tmRoot"/>
+      </p:par>
+    </p:tnLst>
+  </p:timing>
+</p:sld>
+</file>
+
+<file path=ppt/slides/slide8.xml><?xml version="1.0" encoding="utf-8"?>
+<p:sld xmlns:a="http://schemas.openxmlformats.org/drawingml/2006/main" xmlns:r="http://schemas.openxmlformats.org/officeDocument/2006/relationships" xmlns:p="http://schemas.openxmlformats.org/presentationml/2006/main">
+  <p:cSld>
+    <p:spTree>
+      <p:nvGrpSpPr>
+        <p:cNvPr id="1" name=""/>
+        <p:cNvGrpSpPr/>
+        <p:nvPr/>
+      </p:nvGrpSpPr>
+      <p:grpSpPr>
+        <a:xfrm>
+          <a:off x="0" y="0"/>
+          <a:ext cx="0" cy="0"/>
+          <a:chOff x="0" y="0"/>
+          <a:chExt cx="0" cy="0"/>
+        </a:xfrm>
+      </p:grpSpPr>
+      <p:sp>
+        <p:nvSpPr>
+          <p:cNvPr id="2" name="Title 1"/>
+          <p:cNvSpPr>
+            <a:spLocks noGrp="1"/>
+          </p:cNvSpPr>
+          <p:nvPr>
+            <p:ph type="title"/>
+          </p:nvPr>
+        </p:nvSpPr>
+        <p:spPr/>
+        <p:txBody>
+          <a:bodyPr>
+            <a:normAutofit/>
+          </a:bodyPr>
+          <a:lstStyle/>
+          <a:p>
+            <a:r>
+              <a:rPr lang="en-US" dirty="0" smtClean="0"/>
+              <a:t>Download and experiment!</a:t>
+            </a:r>
+            <a:endParaRPr lang="en-US" dirty="0"/>
+          </a:p>
+        </p:txBody>
+      </p:sp>
+      <p:sp>
+        <p:nvSpPr>
+          <p:cNvPr id="22" name="TextBox 21"/>
+          <p:cNvSpPr txBox="1"/>
+          <p:nvPr/>
+        </p:nvSpPr>
+        <p:spPr>
+          <a:xfrm>
+            <a:off x="628403" y="1206654"/>
+            <a:ext cx="7499597" cy="2523768"/>
+          </a:xfrm>
+          <a:prstGeom prst="rect">
+            <a:avLst/>
+          </a:prstGeom>
+          <a:noFill/>
+        </p:spPr>
+        <p:txBody>
+          <a:bodyPr wrap="square" rtlCol="0">
+            <a:spAutoFit/>
+          </a:bodyPr>
+          <a:lstStyle/>
+          <a:p>
+            <a:r>
+              <a:rPr lang="en-US" sz="2400" dirty="0">
+                <a:hlinkClick r:id="rId2"/>
+              </a:rPr>
+              <a:t>https://github.com/buzzm/</a:t>
+            </a:r>
+            <a:r>
+              <a:rPr lang="en-US" sz="2400" dirty="0" smtClean="0">
+                <a:hlinkClick r:id="rId2"/>
+              </a:rPr>
+              <a:t>ipsum</a:t>
+            </a:r>
+            <a:endParaRPr lang="en-US" sz="2400" dirty="0" smtClean="0"/>
+          </a:p>
+          <a:p>
+            <a:endParaRPr lang="en-US" sz="2400" dirty="0" smtClean="0">
+              <a:cs typeface="Courier"/>
+            </a:endParaRPr>
+          </a:p>
+          <a:p>
+            <a:pPr marL="342900" indent="-342900">
+              <a:buFont typeface="Arial"/>
+              <a:buChar char="•"/>
+            </a:pPr>
+            <a:r>
+              <a:rPr lang="en-US" sz="2400" dirty="0" smtClean="0">
+                <a:cs typeface="Courier"/>
+              </a:rPr>
+              <a:t>Several sample shape files to guide you</a:t>
+            </a:r>
+          </a:p>
+          <a:p>
+            <a:pPr marL="342900" indent="-342900">
+              <a:buFont typeface="Arial"/>
+              <a:buChar char="•"/>
+            </a:pPr>
+            <a:r>
+              <a:rPr lang="en-US" sz="2400" dirty="0" smtClean="0">
+                <a:cs typeface="Courier"/>
+              </a:rPr>
+              <a:t>Code has NOT been exhaustively tested</a:t>
+            </a:r>
+          </a:p>
+          <a:p>
+            <a:pPr marL="800100" lvl="1" indent="-342900">
+              <a:buFont typeface="Arial"/>
+              <a:buChar char="•"/>
+            </a:pPr>
+            <a:r>
+              <a:rPr lang="en-US" sz="2400" dirty="0" smtClean="0">
+                <a:cs typeface="Courier"/>
+              </a:rPr>
+              <a:t>…but Daniel </a:t>
+            </a:r>
+            <a:r>
+              <a:rPr lang="en-US" sz="2400" dirty="0" err="1" smtClean="0">
+                <a:cs typeface="Courier"/>
+              </a:rPr>
+              <a:t>Coupal</a:t>
+            </a:r>
+            <a:r>
+              <a:rPr lang="en-US" sz="2400" dirty="0" smtClean="0">
+                <a:cs typeface="Courier"/>
+              </a:rPr>
+              <a:t> tried it for something and it did not crash and burn</a:t>
+            </a:r>
+            <a:endParaRPr lang="en-US" sz="2400" dirty="0">
+              <a:cs typeface="Courier"/>
+            </a:endParaRPr>
+          </a:p>
+          <a:p>
+            <a:endParaRPr lang="en-US" sz="1400" dirty="0" smtClean="0">
+              <a:latin typeface="Courier"/>
+              <a:cs typeface="Courier"/>
+            </a:endParaRPr>
+          </a:p>
+        </p:txBody>
+      </p:sp>
+    </p:spTree>
+    <p:extLst>
+      <p:ext uri="{BB962C8B-B14F-4D97-AF65-F5344CB8AC3E}">
+        <p14:creationId xmlns:p14="http://schemas.microsoft.com/office/powerpoint/2010/main" val="2546743122"/>
       </p:ext>
     </p:extLst>
   </p:cSld>

</xml_diff>

<commit_message>
Some more minor tweaks.
</commit_message>
<xml_diff>
--- a/ipsum.pptx
+++ b/ipsum.pptx
@@ -5,10 +5,10 @@
     <p:sldMasterId id="2147483648" r:id="rId1"/>
   </p:sldMasterIdLst>
   <p:notesMasterIdLst>
-    <p:notesMasterId r:id="rId10"/>
+    <p:notesMasterId r:id="rId11"/>
   </p:notesMasterIdLst>
   <p:handoutMasterIdLst>
-    <p:handoutMasterId r:id="rId11"/>
+    <p:handoutMasterId r:id="rId12"/>
   </p:handoutMasterIdLst>
   <p:sldIdLst>
     <p:sldId id="414" r:id="rId2"/>
@@ -16,9 +16,10 @@
     <p:sldId id="418" r:id="rId4"/>
     <p:sldId id="419" r:id="rId5"/>
     <p:sldId id="417" r:id="rId6"/>
-    <p:sldId id="416" r:id="rId7"/>
-    <p:sldId id="413" r:id="rId8"/>
-    <p:sldId id="420" r:id="rId9"/>
+    <p:sldId id="421" r:id="rId7"/>
+    <p:sldId id="416" r:id="rId8"/>
+    <p:sldId id="413" r:id="rId9"/>
+    <p:sldId id="420" r:id="rId10"/>
   </p:sldIdLst>
   <p:sldSz cx="9144000" cy="6858000" type="screen4x3"/>
   <p:notesSz cx="6858000" cy="9144000"/>
@@ -4090,7 +4091,7 @@
         <p:spPr>
           <a:xfrm>
             <a:off x="945427" y="1117135"/>
-            <a:ext cx="7085889" cy="4678204"/>
+            <a:ext cx="7085889" cy="4985980"/>
           </a:xfrm>
           <a:prstGeom prst="rect">
             <a:avLst/>
@@ -4138,11 +4139,22 @@
               <a:buChar char="•"/>
             </a:pPr>
             <a:r>
+              <a:rPr lang="en-US" sz="2000" dirty="0"/>
+              <a:t>Inspired by </a:t>
+            </a:r>
+            <a:r>
+              <a:rPr lang="en-US" sz="2000" dirty="0">
+                <a:hlinkClick r:id="rId2"/>
+              </a:rPr>
+              <a:t>http://schematic-</a:t>
+            </a:r>
+            <a:r>
               <a:rPr lang="en-US" sz="2000" dirty="0" smtClean="0">
-                <a:cs typeface="Courier"/>
-              </a:rPr>
-              <a:t>Generates random but “appropriate” data given a schema</a:t>
-            </a:r>
+                <a:hlinkClick r:id="rId2"/>
+              </a:rPr>
+              <a:t>ipsum.herokuapp.com</a:t>
+            </a:r>
+            <a:endParaRPr lang="en-US" sz="2000" dirty="0" smtClean="0"/>
           </a:p>
           <a:p>
             <a:pPr marL="800100" lvl="1" indent="-342900">
@@ -4150,11 +4162,22 @@
               <a:buChar char="•"/>
             </a:pPr>
             <a:r>
-              <a:rPr lang="en-US" sz="2000" dirty="0" smtClean="0">
-                <a:cs typeface="Courier"/>
-              </a:rPr>
-              <a:t>Dates, text, email, unique IDs,  variable length arrays,…</a:t>
-            </a:r>
+              <a:rPr lang="en-US" sz="2000" dirty="0" err="1" smtClean="0"/>
+              <a:t>Coffeescript</a:t>
+            </a:r>
+            <a:r>
+              <a:rPr lang="en-US" sz="2000" dirty="0" smtClean="0"/>
+              <a:t> (over </a:t>
+            </a:r>
+            <a:r>
+              <a:rPr lang="en-US" sz="2000" dirty="0" err="1" smtClean="0"/>
+              <a:t>node.js</a:t>
+            </a:r>
+            <a:r>
+              <a:rPr lang="en-US" sz="2000" dirty="0" smtClean="0"/>
+              <a:t>) was … limiting</a:t>
+            </a:r>
+            <a:endParaRPr lang="en-US" sz="2000" dirty="0" smtClean="0"/>
           </a:p>
           <a:p>
             <a:pPr marL="342900" indent="-342900">
@@ -4165,43 +4188,7 @@
               <a:rPr lang="en-US" sz="2000" dirty="0" smtClean="0">
                 <a:cs typeface="Courier"/>
               </a:rPr>
-              <a:t>Schema </a:t>
-            </a:r>
-            <a:r>
-              <a:rPr lang="en-US" sz="2000" dirty="0" err="1" smtClean="0">
-                <a:cs typeface="Courier"/>
-              </a:rPr>
-              <a:t>def</a:t>
-            </a:r>
-            <a:r>
-              <a:rPr lang="en-US" sz="2000" dirty="0" smtClean="0">
-                <a:cs typeface="Courier"/>
-              </a:rPr>
-              <a:t> is </a:t>
-            </a:r>
-            <a:r>
-              <a:rPr lang="en-US" sz="2000" b="1" dirty="0" err="1" smtClean="0">
-                <a:cs typeface="Courier"/>
-              </a:rPr>
-              <a:t>json-schema.org</a:t>
-            </a:r>
-            <a:r>
-              <a:rPr lang="en-US" sz="2000" b="1" dirty="0" smtClean="0">
-                <a:cs typeface="Courier"/>
-              </a:rPr>
-              <a:t> </a:t>
-            </a:r>
-            <a:r>
-              <a:rPr lang="en-US" sz="2000" dirty="0" smtClean="0">
-                <a:cs typeface="Courier"/>
-              </a:rPr>
-              <a:t>(IETF spec in draft, v4</a:t>
-            </a:r>
-            <a:r>
-              <a:rPr lang="en-US" sz="2000" dirty="0" smtClean="0">
-                <a:cs typeface="Courier"/>
-              </a:rPr>
-              <a:t>)</a:t>
+              <a:t>Generates random but “appropriate” data given a schema</a:t>
             </a:r>
           </a:p>
           <a:p>
@@ -4213,23 +4200,8 @@
               <a:rPr lang="en-US" sz="2000" dirty="0" smtClean="0">
                 <a:cs typeface="Courier"/>
               </a:rPr>
-              <a:t>Extended with the “</a:t>
-            </a:r>
-            <a:r>
-              <a:rPr lang="en-US" sz="2000" dirty="0" err="1" smtClean="0">
-                <a:cs typeface="Courier"/>
-              </a:rPr>
-              <a:t>ipsum</a:t>
-            </a:r>
-            <a:r>
-              <a:rPr lang="en-US" sz="2000" dirty="0" smtClean="0">
-                <a:cs typeface="Courier"/>
-              </a:rPr>
-              <a:t>” field as peer to “type” </a:t>
-            </a:r>
-            <a:endParaRPr lang="en-US" sz="2000" dirty="0" smtClean="0">
-              <a:cs typeface="Courier"/>
-            </a:endParaRPr>
+              <a:t>Dates, text, email, unique IDs,  variable length arrays,…</a:t>
+            </a:r>
           </a:p>
           <a:p>
             <a:pPr marL="342900" indent="-342900">
@@ -4240,7 +4212,43 @@
               <a:rPr lang="en-US" sz="2000" dirty="0" smtClean="0">
                 <a:cs typeface="Courier"/>
               </a:rPr>
-              <a:t>Why?</a:t>
+              <a:t>Schema </a:t>
+            </a:r>
+            <a:r>
+              <a:rPr lang="en-US" sz="2000" dirty="0" err="1" smtClean="0">
+                <a:cs typeface="Courier"/>
+              </a:rPr>
+              <a:t>def</a:t>
+            </a:r>
+            <a:r>
+              <a:rPr lang="en-US" sz="2000" dirty="0" smtClean="0">
+                <a:cs typeface="Courier"/>
+              </a:rPr>
+              <a:t> is </a:t>
+            </a:r>
+            <a:r>
+              <a:rPr lang="en-US" sz="2000" b="1" dirty="0" err="1" smtClean="0">
+                <a:cs typeface="Courier"/>
+              </a:rPr>
+              <a:t>json-schema.org</a:t>
+            </a:r>
+            <a:r>
+              <a:rPr lang="en-US" sz="2000" b="1" dirty="0" smtClean="0">
+                <a:cs typeface="Courier"/>
+              </a:rPr>
+              <a:t> </a:t>
+            </a:r>
+            <a:r>
+              <a:rPr lang="en-US" sz="2000" dirty="0" smtClean="0">
+                <a:cs typeface="Courier"/>
+              </a:rPr>
+              <a:t>(IETF spec in draft, v4</a:t>
+            </a:r>
+            <a:r>
+              <a:rPr lang="en-US" sz="2000" dirty="0" smtClean="0">
+                <a:cs typeface="Courier"/>
+              </a:rPr>
+              <a:t>)</a:t>
             </a:r>
           </a:p>
           <a:p>
@@ -4252,11 +4260,26 @@
               <a:rPr lang="en-US" sz="2000" dirty="0" smtClean="0">
                 <a:cs typeface="Courier"/>
               </a:rPr>
-              <a:t>Experiment with shapes of data</a:t>
-            </a:r>
-          </a:p>
-          <a:p>
-            <a:pPr marL="1257300" lvl="2" indent="-342900">
+              <a:t>Extended with the “</a:t>
+            </a:r>
+            <a:r>
+              <a:rPr lang="en-US" sz="2000" dirty="0" err="1" smtClean="0">
+                <a:cs typeface="Courier"/>
+              </a:rPr>
+              <a:t>ipsum</a:t>
+            </a:r>
+            <a:r>
+              <a:rPr lang="en-US" sz="2000" dirty="0" smtClean="0">
+                <a:cs typeface="Courier"/>
+              </a:rPr>
+              <a:t>” field as peer to “type” </a:t>
+            </a:r>
+            <a:endParaRPr lang="en-US" sz="2000" dirty="0" smtClean="0">
+              <a:cs typeface="Courier"/>
+            </a:endParaRPr>
+          </a:p>
+          <a:p>
+            <a:pPr marL="342900" indent="-342900">
               <a:buFont typeface="Arial"/>
               <a:buChar char="•"/>
             </a:pPr>
@@ -4264,55 +4287,7 @@
               <a:rPr lang="en-US" sz="2000" dirty="0" smtClean="0">
                 <a:cs typeface="Courier"/>
               </a:rPr>
-              <a:t>Performance of queries on well-distributed data</a:t>
-            </a:r>
-          </a:p>
-          <a:p>
-            <a:pPr marL="1257300" lvl="2" indent="-342900">
-              <a:buFont typeface="Arial"/>
-              <a:buChar char="•"/>
-            </a:pPr>
-            <a:r>
-              <a:rPr lang="en-US" sz="2000" dirty="0" smtClean="0">
-                <a:cs typeface="Courier"/>
-              </a:rPr>
-              <a:t>Exploit </a:t>
-            </a:r>
-            <a:r>
-              <a:rPr lang="en-US" sz="2000" dirty="0" err="1" smtClean="0">
-                <a:cs typeface="Courier"/>
-              </a:rPr>
-              <a:t>mongoDB</a:t>
-            </a:r>
-            <a:r>
-              <a:rPr lang="en-US" sz="2000" dirty="0" smtClean="0">
-                <a:cs typeface="Courier"/>
-              </a:rPr>
-              <a:t> read/write symmetry to quickly prototype non-trivial shapes (try THAT on Oracle)</a:t>
-            </a:r>
-          </a:p>
-          <a:p>
-            <a:pPr marL="1257300" lvl="2" indent="-342900">
-              <a:buFont typeface="Arial"/>
-              <a:buChar char="•"/>
-            </a:pPr>
-            <a:r>
-              <a:rPr lang="en-US" sz="2000" dirty="0" smtClean="0">
-                <a:cs typeface="Courier"/>
-              </a:rPr>
-              <a:t>Rapidly </a:t>
-            </a:r>
-            <a:r>
-              <a:rPr lang="en-US" sz="2000" dirty="0" err="1" smtClean="0">
-                <a:cs typeface="Courier"/>
-              </a:rPr>
-              <a:t>grok</a:t>
-            </a:r>
-            <a:r>
-              <a:rPr lang="en-US" sz="2000" dirty="0" smtClean="0">
-                <a:cs typeface="Courier"/>
-              </a:rPr>
-              <a:t> consequences of array-based designs</a:t>
+              <a:t>Why?</a:t>
             </a:r>
           </a:p>
           <a:p>
@@ -4324,6 +4299,72 @@
               <a:rPr lang="en-US" sz="2000" dirty="0" smtClean="0">
                 <a:cs typeface="Courier"/>
               </a:rPr>
+              <a:t>Performance </a:t>
+            </a:r>
+            <a:r>
+              <a:rPr lang="en-US" sz="2000" dirty="0" smtClean="0">
+                <a:cs typeface="Courier"/>
+              </a:rPr>
+              <a:t>of queries on well-distributed data</a:t>
+            </a:r>
+          </a:p>
+          <a:p>
+            <a:pPr marL="800100" lvl="1" indent="-342900">
+              <a:buFont typeface="Arial"/>
+              <a:buChar char="•"/>
+            </a:pPr>
+            <a:r>
+              <a:rPr lang="en-US" sz="2000" dirty="0" smtClean="0">
+                <a:cs typeface="Courier"/>
+              </a:rPr>
+              <a:t>Exploit </a:t>
+            </a:r>
+            <a:r>
+              <a:rPr lang="en-US" sz="2000" dirty="0" err="1" smtClean="0">
+                <a:cs typeface="Courier"/>
+              </a:rPr>
+              <a:t>mongoDB</a:t>
+            </a:r>
+            <a:r>
+              <a:rPr lang="en-US" sz="2000" dirty="0" smtClean="0">
+                <a:cs typeface="Courier"/>
+              </a:rPr>
+              <a:t> read/write symmetry to quickly prototype non-trivial shapes (try THAT on Oracle)</a:t>
+            </a:r>
+          </a:p>
+          <a:p>
+            <a:pPr marL="800100" lvl="1" indent="-342900">
+              <a:buFont typeface="Arial"/>
+              <a:buChar char="•"/>
+            </a:pPr>
+            <a:r>
+              <a:rPr lang="en-US" sz="2000" dirty="0" smtClean="0">
+                <a:cs typeface="Courier"/>
+              </a:rPr>
+              <a:t>Rapidly </a:t>
+            </a:r>
+            <a:r>
+              <a:rPr lang="en-US" sz="2000" dirty="0" err="1" smtClean="0">
+                <a:cs typeface="Courier"/>
+              </a:rPr>
+              <a:t>grok</a:t>
+            </a:r>
+            <a:r>
+              <a:rPr lang="en-US" sz="2000" dirty="0" smtClean="0">
+                <a:cs typeface="Courier"/>
+              </a:rPr>
+              <a:t> consequences of array-based designs</a:t>
+            </a:r>
+          </a:p>
+          <a:p>
+            <a:pPr marL="800100" lvl="1" indent="-342900">
+              <a:buFont typeface="Arial"/>
+              <a:buChar char="•"/>
+            </a:pPr>
+            <a:r>
+              <a:rPr lang="en-US" sz="2000" dirty="0" smtClean="0">
+                <a:cs typeface="Courier"/>
+              </a:rPr>
               <a:t>Understand import/export/batch load dynamics</a:t>
             </a:r>
           </a:p>
@@ -4357,24 +4398,24 @@
               <a:buChar char="•"/>
             </a:pPr>
             <a:r>
-              <a:rPr lang="en-US" dirty="0" smtClean="0">
+              <a:rPr lang="en-US" sz="1400" dirty="0" smtClean="0">
                 <a:cs typeface="Courier"/>
               </a:rPr>
               <a:t>I think we’re </a:t>
             </a:r>
             <a:r>
-              <a:rPr lang="en-US" dirty="0" err="1" smtClean="0">
+              <a:rPr lang="en-US" sz="1400" dirty="0" err="1" smtClean="0">
                 <a:cs typeface="Courier"/>
               </a:rPr>
               <a:t>gonna</a:t>
             </a:r>
             <a:r>
-              <a:rPr lang="en-US" dirty="0" smtClean="0">
+              <a:rPr lang="en-US" sz="1400" dirty="0" smtClean="0">
                 <a:cs typeface="Courier"/>
               </a:rPr>
               <a:t> need “schema-like” capability in the future</a:t>
             </a:r>
-            <a:endParaRPr lang="en-US" dirty="0">
+            <a:endParaRPr lang="en-US" sz="1400" dirty="0">
               <a:cs typeface="Courier"/>
             </a:endParaRPr>
           </a:p>
@@ -4490,15 +4531,33 @@
                                   </p:childTnLst>
                                 </p:cTn>
                               </p:par>
+                            </p:childTnLst>
+                          </p:cTn>
+                        </p:par>
+                      </p:childTnLst>
+                    </p:cTn>
+                  </p:par>
+                  <p:par>
+                    <p:cTn id="11" fill="hold">
+                      <p:stCondLst>
+                        <p:cond delay="indefinite"/>
+                      </p:stCondLst>
+                      <p:childTnLst>
+                        <p:par>
+                          <p:cTn id="12" fill="hold">
+                            <p:stCondLst>
+                              <p:cond delay="0"/>
+                            </p:stCondLst>
+                            <p:childTnLst>
                               <p:par>
-                                <p:cTn id="11" presetID="1" presetClass="entr" presetSubtype="0" fill="hold" nodeType="withEffect">
+                                <p:cTn id="13" presetID="1" presetClass="entr" presetSubtype="0" fill="hold" nodeType="clickEffect">
                                   <p:stCondLst>
                                     <p:cond delay="0"/>
                                   </p:stCondLst>
                                   <p:childTnLst>
                                     <p:set>
                                       <p:cBhvr>
-                                        <p:cTn id="12" dur="1" fill="hold">
+                                        <p:cTn id="14" dur="1" fill="hold">
                                           <p:stCondLst>
                                             <p:cond delay="0"/>
                                           </p:stCondLst>
@@ -4528,26 +4587,26 @@
                     </p:cTn>
                   </p:par>
                   <p:par>
-                    <p:cTn id="13" fill="hold">
+                    <p:cTn id="15" fill="hold">
                       <p:stCondLst>
                         <p:cond delay="indefinite"/>
                       </p:stCondLst>
                       <p:childTnLst>
                         <p:par>
-                          <p:cTn id="14" fill="hold">
+                          <p:cTn id="16" fill="hold">
                             <p:stCondLst>
                               <p:cond delay="0"/>
                             </p:stCondLst>
                             <p:childTnLst>
                               <p:par>
-                                <p:cTn id="15" presetID="1" presetClass="entr" presetSubtype="0" fill="hold" nodeType="clickEffect">
+                                <p:cTn id="17" presetID="1" presetClass="entr" presetSubtype="0" fill="hold" nodeType="clickEffect">
                                   <p:stCondLst>
                                     <p:cond delay="0"/>
                                   </p:stCondLst>
                                   <p:childTnLst>
                                     <p:set>
                                       <p:cBhvr>
-                                        <p:cTn id="16" dur="1" fill="hold">
+                                        <p:cTn id="18" dur="1" fill="hold">
                                           <p:stCondLst>
                                             <p:cond delay="0"/>
                                           </p:stCondLst>
@@ -4570,26 +4629,8 @@
                                   </p:childTnLst>
                                 </p:cTn>
                               </p:par>
-                            </p:childTnLst>
-                          </p:cTn>
-                        </p:par>
-                      </p:childTnLst>
-                    </p:cTn>
-                  </p:par>
-                  <p:par>
-                    <p:cTn id="17" fill="hold">
-                      <p:stCondLst>
-                        <p:cond delay="indefinite"/>
-                      </p:stCondLst>
-                      <p:childTnLst>
-                        <p:par>
-                          <p:cTn id="18" fill="hold">
-                            <p:stCondLst>
-                              <p:cond delay="0"/>
-                            </p:stCondLst>
-                            <p:childTnLst>
                               <p:par>
-                                <p:cTn id="19" presetID="1" presetClass="entr" presetSubtype="0" fill="hold" nodeType="clickEffect">
+                                <p:cTn id="19" presetID="1" presetClass="entr" presetSubtype="0" fill="hold" nodeType="withEffect">
                                   <p:stCondLst>
                                     <p:cond delay="0"/>
                                   </p:stCondLst>
@@ -4668,15 +4709,33 @@
                                   </p:childTnLst>
                                 </p:cTn>
                               </p:par>
+                            </p:childTnLst>
+                          </p:cTn>
+                        </p:par>
+                      </p:childTnLst>
+                    </p:cTn>
+                  </p:par>
+                  <p:par>
+                    <p:cTn id="25" fill="hold">
+                      <p:stCondLst>
+                        <p:cond delay="indefinite"/>
+                      </p:stCondLst>
+                      <p:childTnLst>
+                        <p:par>
+                          <p:cTn id="26" fill="hold">
+                            <p:stCondLst>
+                              <p:cond delay="0"/>
+                            </p:stCondLst>
+                            <p:childTnLst>
                               <p:par>
-                                <p:cTn id="25" presetID="1" presetClass="entr" presetSubtype="0" fill="hold" nodeType="withEffect">
+                                <p:cTn id="27" presetID="1" presetClass="entr" presetSubtype="0" fill="hold" nodeType="clickEffect">
                                   <p:stCondLst>
                                     <p:cond delay="0"/>
                                   </p:stCondLst>
                                   <p:childTnLst>
                                     <p:set>
                                       <p:cBhvr>
-                                        <p:cTn id="26" dur="1" fill="hold">
+                                        <p:cTn id="28" dur="1" fill="hold">
                                           <p:stCondLst>
                                             <p:cond delay="0"/>
                                           </p:stCondLst>
@@ -4699,70 +4758,26 @@
                                   </p:childTnLst>
                                 </p:cTn>
                               </p:par>
+                            </p:childTnLst>
+                          </p:cTn>
+                        </p:par>
+                      </p:childTnLst>
+                    </p:cTn>
+                  </p:par>
+                  <p:par>
+                    <p:cTn id="29" fill="hold">
+                      <p:stCondLst>
+                        <p:cond delay="indefinite"/>
+                      </p:stCondLst>
+                      <p:childTnLst>
+                        <p:par>
+                          <p:cTn id="30" fill="hold">
+                            <p:stCondLst>
+                              <p:cond delay="0"/>
+                            </p:stCondLst>
+                            <p:childTnLst>
                               <p:par>
-                                <p:cTn id="27" presetID="1" presetClass="entr" presetSubtype="0" fill="hold" nodeType="withEffect">
-                                  <p:stCondLst>
-                                    <p:cond delay="0"/>
-                                  </p:stCondLst>
-                                  <p:childTnLst>
-                                    <p:set>
-                                      <p:cBhvr>
-                                        <p:cTn id="28" dur="1" fill="hold">
-                                          <p:stCondLst>
-                                            <p:cond delay="0"/>
-                                          </p:stCondLst>
-                                        </p:cTn>
-                                        <p:tgtEl>
-                                          <p:spTgt spid="23">
-                                            <p:txEl>
-                                              <p:pRg st="7" end="7"/>
-                                            </p:txEl>
-                                          </p:spTgt>
-                                        </p:tgtEl>
-                                        <p:attrNameLst>
-                                          <p:attrName>style.visibility</p:attrName>
-                                        </p:attrNameLst>
-                                      </p:cBhvr>
-                                      <p:to>
-                                        <p:strVal val="visible"/>
-                                      </p:to>
-                                    </p:set>
-                                  </p:childTnLst>
-                                </p:cTn>
-                              </p:par>
-                              <p:par>
-                                <p:cTn id="29" presetID="1" presetClass="entr" presetSubtype="0" fill="hold" nodeType="withEffect">
-                                  <p:stCondLst>
-                                    <p:cond delay="0"/>
-                                  </p:stCondLst>
-                                  <p:childTnLst>
-                                    <p:set>
-                                      <p:cBhvr>
-                                        <p:cTn id="30" dur="1" fill="hold">
-                                          <p:stCondLst>
-                                            <p:cond delay="0"/>
-                                          </p:stCondLst>
-                                        </p:cTn>
-                                        <p:tgtEl>
-                                          <p:spTgt spid="23">
-                                            <p:txEl>
-                                              <p:pRg st="8" end="8"/>
-                                            </p:txEl>
-                                          </p:spTgt>
-                                        </p:tgtEl>
-                                        <p:attrNameLst>
-                                          <p:attrName>style.visibility</p:attrName>
-                                        </p:attrNameLst>
-                                      </p:cBhvr>
-                                      <p:to>
-                                        <p:strVal val="visible"/>
-                                      </p:to>
-                                    </p:set>
-                                  </p:childTnLst>
-                                </p:cTn>
-                              </p:par>
-                              <p:par>
-                                <p:cTn id="31" presetID="1" presetClass="entr" presetSubtype="0" fill="hold" nodeType="withEffect">
+                                <p:cTn id="31" presetID="1" presetClass="entr" presetSubtype="0" fill="hold" nodeType="clickEffect">
                                   <p:stCondLst>
                                     <p:cond delay="0"/>
                                   </p:stCondLst>
@@ -4777,7 +4792,7 @@
                                         <p:tgtEl>
                                           <p:spTgt spid="23">
                                             <p:txEl>
-                                              <p:pRg st="9" end="9"/>
+                                              <p:pRg st="7" end="7"/>
                                             </p:txEl>
                                           </p:spTgt>
                                         </p:tgtEl>
@@ -4808,7 +4823,7 @@
                                         <p:tgtEl>
                                           <p:spTgt spid="23">
                                             <p:txEl>
-                                              <p:pRg st="10" end="10"/>
+                                              <p:pRg st="8" end="8"/>
                                             </p:txEl>
                                           </p:spTgt>
                                         </p:tgtEl>
@@ -4823,26 +4838,39 @@
                                   </p:childTnLst>
                                 </p:cTn>
                               </p:par>
-                            </p:childTnLst>
-                          </p:cTn>
-                        </p:par>
-                      </p:childTnLst>
-                    </p:cTn>
-                  </p:par>
-                  <p:par>
-                    <p:cTn id="35" fill="hold">
-                      <p:stCondLst>
-                        <p:cond delay="indefinite"/>
-                      </p:stCondLst>
-                      <p:childTnLst>
-                        <p:par>
-                          <p:cTn id="36" fill="hold">
-                            <p:stCondLst>
-                              <p:cond delay="0"/>
-                            </p:stCondLst>
-                            <p:childTnLst>
                               <p:par>
-                                <p:cTn id="37" presetID="1" presetClass="entr" presetSubtype="0" fill="hold" nodeType="clickEffect">
+                                <p:cTn id="35" presetID="1" presetClass="entr" presetSubtype="0" fill="hold" nodeType="withEffect">
+                                  <p:stCondLst>
+                                    <p:cond delay="0"/>
+                                  </p:stCondLst>
+                                  <p:childTnLst>
+                                    <p:set>
+                                      <p:cBhvr>
+                                        <p:cTn id="36" dur="1" fill="hold">
+                                          <p:stCondLst>
+                                            <p:cond delay="0"/>
+                                          </p:stCondLst>
+                                        </p:cTn>
+                                        <p:tgtEl>
+                                          <p:spTgt spid="23">
+                                            <p:txEl>
+                                              <p:pRg st="9" end="9"/>
+                                            </p:txEl>
+                                          </p:spTgt>
+                                        </p:tgtEl>
+                                        <p:attrNameLst>
+                                          <p:attrName>style.visibility</p:attrName>
+                                        </p:attrNameLst>
+                                      </p:cBhvr>
+                                      <p:to>
+                                        <p:strVal val="visible"/>
+                                      </p:to>
+                                    </p:set>
+                                  </p:childTnLst>
+                                </p:cTn>
+                              </p:par>
+                              <p:par>
+                                <p:cTn id="37" presetID="1" presetClass="entr" presetSubtype="0" fill="hold" nodeType="withEffect">
                                   <p:stCondLst>
                                     <p:cond delay="0"/>
                                   </p:stCondLst>
@@ -4857,7 +4885,7 @@
                                         <p:tgtEl>
                                           <p:spTgt spid="23">
                                             <p:txEl>
-                                              <p:pRg st="11" end="11"/>
+                                              <p:pRg st="10" end="10"/>
                                             </p:txEl>
                                           </p:spTgt>
                                         </p:tgtEl>
@@ -4888,6 +4916,55 @@
                                         <p:tgtEl>
                                           <p:spTgt spid="23">
                                             <p:txEl>
+                                              <p:pRg st="11" end="11"/>
+                                            </p:txEl>
+                                          </p:spTgt>
+                                        </p:tgtEl>
+                                        <p:attrNameLst>
+                                          <p:attrName>style.visibility</p:attrName>
+                                        </p:attrNameLst>
+                                      </p:cBhvr>
+                                      <p:to>
+                                        <p:strVal val="visible"/>
+                                      </p:to>
+                                    </p:set>
+                                  </p:childTnLst>
+                                </p:cTn>
+                              </p:par>
+                            </p:childTnLst>
+                          </p:cTn>
+                        </p:par>
+                      </p:childTnLst>
+                    </p:cTn>
+                  </p:par>
+                  <p:par>
+                    <p:cTn id="41" fill="hold">
+                      <p:stCondLst>
+                        <p:cond delay="indefinite"/>
+                      </p:stCondLst>
+                      <p:childTnLst>
+                        <p:par>
+                          <p:cTn id="42" fill="hold">
+                            <p:stCondLst>
+                              <p:cond delay="0"/>
+                            </p:stCondLst>
+                            <p:childTnLst>
+                              <p:par>
+                                <p:cTn id="43" presetID="1" presetClass="entr" presetSubtype="0" fill="hold" nodeType="clickEffect">
+                                  <p:stCondLst>
+                                    <p:cond delay="0"/>
+                                  </p:stCondLst>
+                                  <p:childTnLst>
+                                    <p:set>
+                                      <p:cBhvr>
+                                        <p:cTn id="44" dur="1" fill="hold">
+                                          <p:stCondLst>
+                                            <p:cond delay="0"/>
+                                          </p:stCondLst>
+                                        </p:cTn>
+                                        <p:tgtEl>
+                                          <p:spTgt spid="23">
+                                            <p:txEl>
                                               <p:pRg st="12" end="12"/>
                                             </p:txEl>
                                           </p:spTgt>
@@ -4904,14 +4981,14 @@
                                 </p:cTn>
                               </p:par>
                               <p:par>
-                                <p:cTn id="41" presetID="1" presetClass="entr" presetSubtype="0" fill="hold" nodeType="withEffect">
+                                <p:cTn id="45" presetID="1" presetClass="entr" presetSubtype="0" fill="hold" nodeType="withEffect">
                                   <p:stCondLst>
                                     <p:cond delay="0"/>
                                   </p:stCondLst>
                                   <p:childTnLst>
                                     <p:set>
                                       <p:cBhvr>
-                                        <p:cTn id="42" dur="1" fill="hold">
+                                        <p:cTn id="46" dur="1" fill="hold">
                                           <p:stCondLst>
                                             <p:cond delay="0"/>
                                           </p:stCondLst>
@@ -4920,6 +4997,37 @@
                                           <p:spTgt spid="23">
                                             <p:txEl>
                                               <p:pRg st="13" end="13"/>
+                                            </p:txEl>
+                                          </p:spTgt>
+                                        </p:tgtEl>
+                                        <p:attrNameLst>
+                                          <p:attrName>style.visibility</p:attrName>
+                                        </p:attrNameLst>
+                                      </p:cBhvr>
+                                      <p:to>
+                                        <p:strVal val="visible"/>
+                                      </p:to>
+                                    </p:set>
+                                  </p:childTnLst>
+                                </p:cTn>
+                              </p:par>
+                              <p:par>
+                                <p:cTn id="47" presetID="1" presetClass="entr" presetSubtype="0" fill="hold" nodeType="withEffect">
+                                  <p:stCondLst>
+                                    <p:cond delay="0"/>
+                                  </p:stCondLst>
+                                  <p:childTnLst>
+                                    <p:set>
+                                      <p:cBhvr>
+                                        <p:cTn id="48" dur="1" fill="hold">
+                                          <p:stCondLst>
+                                            <p:cond delay="0"/>
+                                          </p:stCondLst>
+                                        </p:cTn>
+                                        <p:tgtEl>
+                                          <p:spTgt spid="23">
+                                            <p:txEl>
+                                              <p:pRg st="14" end="14"/>
                                             </p:txEl>
                                           </p:spTgt>
                                         </p:tgtEl>
@@ -6610,7 +6718,7 @@
           <a:p>
             <a:r>
               <a:rPr lang="en-US" dirty="0" smtClean="0"/>
-              <a:t>Cool new </a:t>
+              <a:t>Existing </a:t>
             </a:r>
             <a:r>
               <a:rPr lang="en-US" dirty="0" err="1" smtClean="0"/>
@@ -6618,11 +6726,7 @@
             </a:r>
             <a:r>
               <a:rPr lang="en-US" dirty="0" smtClean="0"/>
-              <a:t> </a:t>
-            </a:r>
-            <a:r>
-              <a:rPr lang="en-US" dirty="0" smtClean="0"/>
-              <a:t>features</a:t>
+              <a:t> features (from web)</a:t>
             </a:r>
             <a:endParaRPr lang="en-US" dirty="0"/>
           </a:p>
@@ -6637,14 +6741,14 @@
           <p:nvPr>
             <p:extLst>
               <p:ext uri="{D42A27DB-BD31-4B8C-83A1-F6EECF244321}">
-                <p14:modId xmlns:p14="http://schemas.microsoft.com/office/powerpoint/2010/main" val="2466665553"/>
+                <p14:modId xmlns:p14="http://schemas.microsoft.com/office/powerpoint/2010/main" val="2097199888"/>
               </p:ext>
             </p:extLst>
           </p:nvPr>
         </p:nvGraphicFramePr>
         <p:xfrm>
           <a:off x="825500" y="1219380"/>
-          <a:ext cx="7275286" cy="4613263"/>
+          <a:ext cx="7275286" cy="3072085"/>
         </p:xfrm>
         <a:graphic>
           <a:graphicData uri="http://schemas.openxmlformats.org/drawingml/2006/table">
@@ -6662,11 +6766,52 @@
                     <a:bodyPr/>
                     <a:lstStyle/>
                     <a:p>
+                      <a:pPr marL="0" marR="0" indent="0" algn="l" defTabSz="457200" rtl="0" eaLnBrk="1" fontAlgn="auto" latinLnBrk="0" hangingPunct="1">
+                        <a:lnSpc>
+                          <a:spcPct val="100000"/>
+                        </a:lnSpc>
+                        <a:spcBef>
+                          <a:spcPts val="0"/>
+                        </a:spcBef>
+                        <a:spcAft>
+                          <a:spcPts val="0"/>
+                        </a:spcAft>
+                        <a:buClrTx/>
+                        <a:buSzTx/>
+                        <a:buFontTx/>
+                        <a:buNone/>
+                        <a:tabLst/>
+                        <a:defRPr/>
+                      </a:pPr>
                       <a:r>
                         <a:rPr lang="en-US" sz="1400" dirty="0" smtClean="0"/>
-                        <a:t>Fragment</a:t>
-                      </a:r>
-                      <a:endParaRPr lang="en-US" sz="1400" dirty="0"/>
+                        <a:t>{</a:t>
+                      </a:r>
+                      <a:r>
+                        <a:rPr lang="en-US" sz="1400" baseline="0" dirty="0" smtClean="0"/>
+                        <a:t> “type”: “string”,  “</a:t>
+                      </a:r>
+                      <a:r>
+                        <a:rPr lang="en-US" sz="1400" baseline="0" dirty="0" err="1" smtClean="0"/>
+                        <a:t>ipsum</a:t>
+                      </a:r>
+                      <a:r>
+                        <a:rPr lang="en-US" sz="1400" baseline="0" dirty="0" smtClean="0"/>
+                        <a:t>”: </a:t>
+                      </a:r>
+                      <a:r>
+                        <a:rPr lang="en-US" sz="1400" baseline="0" dirty="0" smtClean="0">
+                          <a:solidFill>
+                            <a:schemeClr val="tx1"/>
+                          </a:solidFill>
+                        </a:rPr>
+                        <a:t>value</a:t>
+                      </a:r>
+                      <a:r>
+                        <a:rPr lang="en-US" sz="1400" baseline="0" dirty="0" smtClean="0"/>
+                        <a:t> }</a:t>
+                      </a:r>
+                      <a:endParaRPr lang="en-US" sz="1400" dirty="0" smtClean="0"/>
                     </a:p>
                   </a:txBody>
                   <a:tcPr/>
@@ -6676,89 +6821,60 @@
                     <a:bodyPr/>
                     <a:lstStyle/>
                     <a:p>
+                      <a:pPr marL="0" marR="0" indent="0" algn="l" defTabSz="457200" rtl="0" eaLnBrk="1" fontAlgn="auto" latinLnBrk="0" hangingPunct="1">
+                        <a:lnSpc>
+                          <a:spcPct val="100000"/>
+                        </a:lnSpc>
+                        <a:spcBef>
+                          <a:spcPts val="0"/>
+                        </a:spcBef>
+                        <a:spcAft>
+                          <a:spcPts val="0"/>
+                        </a:spcAft>
+                        <a:buClrTx/>
+                        <a:buSzTx/>
+                        <a:buFontTx/>
+                        <a:buNone/>
+                        <a:tabLst/>
+                        <a:defRPr/>
+                      </a:pPr>
                       <a:r>
                         <a:rPr lang="en-US" dirty="0" smtClean="0"/>
-                        <a:t>Description</a:t>
-                      </a:r>
-                      <a:endParaRPr lang="en-US" dirty="0"/>
+                        <a:t>How</a:t>
+                      </a:r>
+                      <a:r>
+                        <a:rPr lang="en-US" baseline="0" dirty="0" smtClean="0"/>
+                        <a:t> </a:t>
+                      </a:r>
+                      <a:r>
+                        <a:rPr lang="en-US" baseline="0" dirty="0" err="1" smtClean="0"/>
+                        <a:t>ipsum</a:t>
+                      </a:r>
+                      <a:r>
+                        <a:rPr lang="en-US" baseline="0" dirty="0" smtClean="0"/>
+                        <a:t> uses them</a:t>
+                      </a:r>
+                      <a:endParaRPr lang="en-US" dirty="0" smtClean="0"/>
                     </a:p>
                   </a:txBody>
                   <a:tcPr/>
                 </a:tc>
               </a:tr>
-              <a:tr h="1020651">
+              <a:tr h="437242">
                 <a:tc>
                   <a:txBody>
                     <a:bodyPr/>
                     <a:lstStyle/>
                     <a:p>
                       <a:r>
-                        <a:rPr lang="nl-NL" sz="1400" dirty="0" smtClean="0">
-                          <a:latin typeface="Courier"/>
+                        <a:rPr lang="nl-NL" sz="1800" dirty="0" smtClean="0">
+                          <a:latin typeface="+mn-lt"/>
                           <a:cs typeface="Courier"/>
                         </a:rPr>
-                        <a:t>"type": "</a:t>
-                      </a:r>
-                      <a:r>
-                        <a:rPr lang="nl-NL" sz="1400" dirty="0" err="1" smtClean="0">
-                          <a:latin typeface="Courier"/>
-                          <a:cs typeface="Courier"/>
-                        </a:rPr>
-                        <a:t>integer|number</a:t>
-                      </a:r>
-                      <a:r>
-                        <a:rPr lang="nl-NL" sz="1400" dirty="0" smtClean="0">
-                          <a:latin typeface="Courier"/>
-                          <a:cs typeface="Courier"/>
-                        </a:rPr>
-                        <a:t>"</a:t>
-                      </a:r>
-                      <a:r>
-                        <a:rPr lang="nl-NL" sz="1400" dirty="0" smtClean="0">
-                          <a:latin typeface="Courier"/>
-                          <a:cs typeface="Courier"/>
-                        </a:rPr>
-                        <a:t>,</a:t>
-                      </a:r>
-                    </a:p>
-                    <a:p>
-                      <a:r>
-                        <a:rPr lang="nl-NL" sz="1400" dirty="0" smtClean="0">
-                          <a:latin typeface="Courier"/>
-                          <a:cs typeface="Courier"/>
-                        </a:rPr>
-                        <a:t>"</a:t>
-                      </a:r>
-                      <a:r>
-                        <a:rPr lang="nl-NL" sz="1400" dirty="0" err="1" smtClean="0">
-                          <a:latin typeface="Courier"/>
-                          <a:cs typeface="Courier"/>
-                        </a:rPr>
-                        <a:t>ipsum</a:t>
-                      </a:r>
-                      <a:r>
-                        <a:rPr lang="nl-NL" sz="1400" dirty="0" smtClean="0">
-                          <a:latin typeface="Courier"/>
-                          <a:cs typeface="Courier"/>
-                        </a:rPr>
-                        <a:t>": { "</a:t>
-                      </a:r>
-                      <a:r>
-                        <a:rPr lang="nl-NL" sz="1400" dirty="0" err="1" smtClean="0">
-                          <a:latin typeface="Courier"/>
-                          <a:cs typeface="Courier"/>
-                        </a:rPr>
-                        <a:t>inc</a:t>
-                      </a:r>
-                      <a:r>
-                        <a:rPr lang="nl-NL" sz="1400" dirty="0" smtClean="0">
-                          <a:latin typeface="Courier"/>
-                          <a:cs typeface="Courier"/>
-                        </a:rPr>
-                        <a:t>": {”start”: v2, “val”: v3}</a:t>
-                      </a:r>
-                      <a:endParaRPr lang="en-US" sz="1400" dirty="0">
-                        <a:latin typeface="Courier"/>
+                        <a:t>word</a:t>
+                      </a:r>
+                      <a:endParaRPr lang="en-US" sz="1800" dirty="0">
+                        <a:latin typeface="+mn-lt"/>
                         <a:cs typeface="Courier"/>
                       </a:endParaRPr>
                     </a:p>
@@ -6771,113 +6887,40 @@
                     <a:lstStyle/>
                     <a:p>
                       <a:r>
-                        <a:rPr lang="en-US" sz="1400" dirty="0" smtClean="0"/>
-                        <a:t>Instead of random </a:t>
-                      </a:r>
-                      <a:r>
-                        <a:rPr lang="en-US" sz="1400" dirty="0" err="1" smtClean="0"/>
-                        <a:t>int</a:t>
-                      </a:r>
-                      <a:r>
-                        <a:rPr lang="en-US" sz="1400" dirty="0" smtClean="0"/>
-                        <a:t> or float,  </a:t>
-                      </a:r>
-                      <a:r>
-                        <a:rPr lang="en-US" sz="1400" dirty="0" smtClean="0"/>
-                        <a:t>start with value</a:t>
-                      </a:r>
-                      <a:r>
-                        <a:rPr lang="en-US" sz="1400" baseline="0" dirty="0" smtClean="0"/>
-                        <a:t> v2 and add v3 for each successive record.  v3 can be negative.  U</a:t>
-                      </a:r>
-                      <a:r>
-                        <a:rPr lang="en-US" sz="1400" dirty="0" smtClean="0"/>
-                        <a:t>seful for creating</a:t>
-                      </a:r>
-                      <a:r>
-                        <a:rPr lang="en-US" sz="1400" baseline="0" dirty="0" smtClean="0"/>
-                        <a:t> things like message </a:t>
-                      </a:r>
-                      <a:r>
-                        <a:rPr lang="en-US" sz="1400" baseline="0" dirty="0" smtClean="0"/>
-                        <a:t>sequence numbers</a:t>
-                      </a:r>
-                      <a:r>
-                        <a:rPr lang="en-US" sz="1400" baseline="0" dirty="0" smtClean="0"/>
-                        <a:t>.  </a:t>
-                      </a:r>
-                      <a:endParaRPr lang="en-US" sz="1400" dirty="0"/>
+                        <a:rPr lang="en-US" sz="1800" dirty="0" smtClean="0">
+                          <a:latin typeface="+mn-lt"/>
+                        </a:rPr>
+                        <a:t>A single word</a:t>
+                      </a:r>
+                      <a:r>
+                        <a:rPr lang="en-US" sz="1800" baseline="0" dirty="0" smtClean="0">
+                          <a:latin typeface="+mn-lt"/>
+                        </a:rPr>
+                        <a:t>  </a:t>
+                      </a:r>
+                      <a:endParaRPr lang="en-US" sz="1800" dirty="0">
+                        <a:latin typeface="+mn-lt"/>
+                      </a:endParaRPr>
                     </a:p>
                   </a:txBody>
                   <a:tcPr/>
                 </a:tc>
               </a:tr>
-              <a:tr h="1247203">
+              <a:tr h="690673">
                 <a:tc>
                   <a:txBody>
                     <a:bodyPr/>
                     <a:lstStyle/>
                     <a:p>
                       <a:r>
-                        <a:rPr lang="nl-NL" sz="1400" dirty="0" smtClean="0">
-                          <a:latin typeface="Courier"/>
+                        <a:rPr lang="en-US" sz="1800" dirty="0" smtClean="0">
+                          <a:latin typeface="+mn-lt"/>
                           <a:cs typeface="Courier"/>
                         </a:rPr>
-                        <a:t>String/date-time</a:t>
-                      </a:r>
-                    </a:p>
-                    <a:p>
-                      <a:r>
-                        <a:rPr lang="nl-NL" sz="1400" dirty="0" smtClean="0">
-                          <a:latin typeface="Courier"/>
-                          <a:cs typeface="Courier"/>
-                        </a:rPr>
-                        <a:t>"</a:t>
-                      </a:r>
-                      <a:r>
-                        <a:rPr lang="nl-NL" sz="1400" dirty="0" err="1" smtClean="0">
-                          <a:latin typeface="Courier"/>
-                          <a:cs typeface="Courier"/>
-                        </a:rPr>
-                        <a:t>ipsum</a:t>
-                      </a:r>
-                      <a:r>
-                        <a:rPr lang="nl-NL" sz="1400" dirty="0" smtClean="0">
-                          <a:latin typeface="Courier"/>
-                          <a:cs typeface="Courier"/>
-                        </a:rPr>
-                        <a:t>": { "</a:t>
-                      </a:r>
-                      <a:r>
-                        <a:rPr lang="nl-NL" sz="1400" dirty="0" err="1" smtClean="0">
-                          <a:latin typeface="Courier"/>
-                          <a:cs typeface="Courier"/>
-                        </a:rPr>
-                        <a:t>inc</a:t>
-                      </a:r>
-                      <a:r>
-                        <a:rPr lang="nl-NL" sz="1400" dirty="0" smtClean="0">
-                          <a:latin typeface="Courier"/>
-                          <a:cs typeface="Courier"/>
-                        </a:rPr>
-                        <a:t>": {”start”: v2, “</a:t>
-                      </a:r>
-                      <a:r>
-                        <a:rPr lang="nl-NL" sz="1400" dirty="0" err="1" smtClean="0">
-                          <a:latin typeface="Courier"/>
-                          <a:cs typeface="Courier"/>
-                        </a:rPr>
-                        <a:t>secs|mins|hrs|days</a:t>
-                      </a:r>
-                      <a:r>
-                        <a:rPr lang="nl-NL" sz="1400" dirty="0" smtClean="0">
-                          <a:latin typeface="Courier"/>
-                          <a:cs typeface="Courier"/>
-                        </a:rPr>
-                        <a:t>”: v3}</a:t>
-                      </a:r>
-                      <a:endParaRPr lang="en-US" sz="1400" dirty="0">
-                        <a:latin typeface="Courier"/>
+                        <a:t>sentence</a:t>
+                      </a:r>
+                      <a:endParaRPr lang="en-US" sz="1800" dirty="0">
+                        <a:latin typeface="+mn-lt"/>
                         <a:cs typeface="Courier"/>
                       </a:endParaRPr>
                     </a:p>
@@ -6890,61 +6933,19 @@
                     <a:lstStyle/>
                     <a:p>
                       <a:r>
-                        <a:rPr lang="en-US" sz="1400" dirty="0" smtClean="0"/>
-                        <a:t>Instead of random date,  start with string </a:t>
-                      </a:r>
-                      <a:r>
-                        <a:rPr lang="en-US" sz="1400" baseline="0" dirty="0" smtClean="0"/>
-                        <a:t>v2 and add some number of </a:t>
-                      </a:r>
-                      <a:r>
-                        <a:rPr lang="en-US" sz="1400" baseline="0" dirty="0" err="1" smtClean="0"/>
-                        <a:t>secs</a:t>
-                      </a:r>
-                      <a:r>
-                        <a:rPr lang="en-US" sz="1400" baseline="0" dirty="0" smtClean="0"/>
-                        <a:t>, </a:t>
-                      </a:r>
-                      <a:r>
-                        <a:rPr lang="en-US" sz="1400" baseline="0" dirty="0" err="1" smtClean="0"/>
-                        <a:t>mins</a:t>
-                      </a:r>
-                      <a:r>
-                        <a:rPr lang="en-US" sz="1400" baseline="0" dirty="0" smtClean="0"/>
-                        <a:t>, </a:t>
-                      </a:r>
-                      <a:r>
-                        <a:rPr lang="en-US" sz="1400" baseline="0" dirty="0" err="1" smtClean="0"/>
-                        <a:t>hrs</a:t>
-                      </a:r>
-                      <a:r>
-                        <a:rPr lang="en-US" sz="1400" baseline="0" dirty="0" smtClean="0"/>
-                        <a:t>, or days v3 for each successive record.  v3 can be negative.   v2 is any string </a:t>
-                      </a:r>
-                      <a:r>
-                        <a:rPr lang="en-US" sz="1400" baseline="0" dirty="0" err="1" smtClean="0"/>
-                        <a:t>parsable</a:t>
-                      </a:r>
-                      <a:r>
-                        <a:rPr lang="en-US" sz="1400" baseline="0" dirty="0" smtClean="0"/>
-                        <a:t> by </a:t>
-                      </a:r>
-                      <a:r>
-                        <a:rPr lang="en-US" sz="1400" baseline="0" dirty="0" err="1" smtClean="0">
-                          <a:latin typeface="Courier"/>
-                          <a:cs typeface="Courier"/>
+                        <a:rPr lang="en-US" sz="1800" dirty="0" smtClean="0">
+                          <a:latin typeface="+mn-lt"/>
                         </a:rPr>
-                        <a:t>dateutil.parser.parse</a:t>
-                      </a:r>
-                      <a:r>
-                        <a:rPr lang="en-US" sz="1400" baseline="0" dirty="0" smtClean="0">
-                          <a:latin typeface="Courier"/>
-                          <a:cs typeface="Courier"/>
+                        <a:t>10 to 20 words (almost</a:t>
+                      </a:r>
+                      <a:r>
+                        <a:rPr lang="en-US" sz="1800" baseline="0" dirty="0" smtClean="0">
+                          <a:latin typeface="+mn-lt"/>
                         </a:rPr>
-                        <a:t>()</a:t>
-                      </a:r>
-                      <a:endParaRPr lang="en-US" sz="1400" dirty="0">
-                        <a:latin typeface="Courier"/>
+                        <a:t> 100% guaranteed NOT to be grammatically correct)</a:t>
+                      </a:r>
+                      <a:endParaRPr lang="en-US" sz="1800" dirty="0">
+                        <a:latin typeface="+mn-lt"/>
                         <a:cs typeface="Courier"/>
                       </a:endParaRPr>
                     </a:p>
@@ -6952,58 +6953,23 @@
                   <a:tcPr/>
                 </a:tc>
               </a:tr>
-              <a:tr h="728205">
+              <a:tr h="456736">
                 <a:tc>
                   <a:txBody>
                     <a:bodyPr/>
                     <a:lstStyle/>
                     <a:p>
                       <a:r>
-                        <a:rPr lang="en-US" sz="1400" dirty="0" smtClean="0">
-                          <a:latin typeface="Courier"/>
+                        <a:rPr lang="en-US" sz="1800" dirty="0" smtClean="0">
+                          <a:latin typeface="+mn-lt"/>
                           <a:cs typeface="Courier"/>
                         </a:rPr>
-                        <a:t>"type": "string",</a:t>
+                        <a:t>paragraph</a:t>
                       </a:r>
                     </a:p>
                     <a:p>
-                      <a:r>
-                        <a:rPr lang="en-US" sz="1400" dirty="0" smtClean="0">
-                          <a:latin typeface="Courier"/>
-                          <a:cs typeface="Courier"/>
-                        </a:rPr>
-                        <a:t>"</a:t>
-                      </a:r>
-                      <a:r>
-                        <a:rPr lang="en-US" sz="1400" dirty="0" err="1" smtClean="0">
-                          <a:latin typeface="Courier"/>
-                          <a:cs typeface="Courier"/>
-                        </a:rPr>
-                        <a:t>ipsum</a:t>
-                      </a:r>
-                      <a:r>
-                        <a:rPr lang="en-US" sz="1400" dirty="0" smtClean="0">
-                          <a:latin typeface="Courier"/>
-                          <a:cs typeface="Courier"/>
-                        </a:rPr>
-                        <a:t>": "</a:t>
-                      </a:r>
-                      <a:r>
-                        <a:rPr lang="en-US" sz="1400" dirty="0" err="1" smtClean="0">
-                          <a:latin typeface="Courier"/>
-                          <a:cs typeface="Courier"/>
-                        </a:rPr>
-                        <a:t>bson:ObjectId</a:t>
-                      </a:r>
-                      <a:r>
-                        <a:rPr lang="en-US" sz="1400" dirty="0" smtClean="0">
-                          <a:latin typeface="Courier"/>
-                          <a:cs typeface="Courier"/>
-                        </a:rPr>
-                        <a:t>"</a:t>
-                      </a:r>
-                      <a:endParaRPr lang="en-US" sz="1400" dirty="0">
-                        <a:latin typeface="Courier"/>
+                      <a:endParaRPr lang="en-US" sz="1800" dirty="0">
+                        <a:latin typeface="+mn-lt"/>
                         <a:cs typeface="Courier"/>
                       </a:endParaRPr>
                     </a:p>
@@ -7016,41 +6982,13 @@
                     <a:lstStyle/>
                     <a:p>
                       <a:r>
-                        <a:rPr lang="en-US" sz="1400" dirty="0" smtClean="0"/>
-                        <a:t>Generate valid unique </a:t>
-                      </a:r>
-                      <a:r>
-                        <a:rPr lang="en-US" sz="1400" dirty="0" err="1" smtClean="0"/>
-                        <a:t>ObjectIds</a:t>
-                      </a:r>
-                      <a:r>
-                        <a:rPr lang="en-US" sz="1400" dirty="0" smtClean="0"/>
-                        <a:t> </a:t>
-                      </a:r>
-                      <a:r>
-                        <a:rPr lang="en-US" sz="1400" dirty="0" err="1" smtClean="0"/>
-                        <a:t>ala</a:t>
-                      </a:r>
-                      <a:r>
-                        <a:rPr lang="en-US" sz="1400" dirty="0" smtClean="0"/>
-                        <a:t> </a:t>
-                      </a:r>
-                    </a:p>
-                    <a:p>
-                      <a:r>
-                        <a:rPr lang="fi-FI" sz="1400" baseline="0" dirty="0" smtClean="0"/>
-                        <a:t>{"$</a:t>
-                      </a:r>
-                      <a:r>
-                        <a:rPr lang="fi-FI" sz="1400" baseline="0" dirty="0" err="1" smtClean="0"/>
-                        <a:t>oid</a:t>
-                      </a:r>
-                      <a:r>
-                        <a:rPr lang="fi-FI" sz="1400" baseline="0" dirty="0" smtClean="0"/>
-                        <a:t>": "52d6c77b4142435025d7c563"}</a:t>
-                      </a:r>
-                      <a:endParaRPr lang="en-US" sz="1400" dirty="0">
-                        <a:latin typeface="Courier"/>
+                        <a:rPr lang="en-US" sz="1800" dirty="0" smtClean="0">
+                          <a:latin typeface="+mn-lt"/>
+                        </a:rPr>
+                        <a:t>10 to about 550 words (see above)</a:t>
+                      </a:r>
+                      <a:endParaRPr lang="en-US" sz="1800" dirty="0">
+                        <a:latin typeface="+mn-lt"/>
                         <a:cs typeface="Courier"/>
                       </a:endParaRPr>
                     </a:p>
@@ -7058,35 +6996,21 @@
                   <a:tcPr/>
                 </a:tc>
               </a:tr>
-              <a:tr h="728205">
+              <a:tr h="562410">
                 <a:tc>
                   <a:txBody>
                     <a:bodyPr/>
                     <a:lstStyle/>
                     <a:p>
                       <a:r>
-                        <a:rPr lang="en-US" sz="1400" dirty="0" smtClean="0">
-                          <a:latin typeface="Courier"/>
+                        <a:rPr lang="en-US" sz="1800" dirty="0" err="1" smtClean="0">
+                          <a:latin typeface="+mn-lt"/>
                           <a:cs typeface="Courier"/>
                         </a:rPr>
-                        <a:t>"</a:t>
-                      </a:r>
-                      <a:r>
-                        <a:rPr lang="en-US" sz="1400" dirty="0" err="1" smtClean="0">
-                          <a:latin typeface="Courier"/>
-                          <a:cs typeface="Courier"/>
-                        </a:rPr>
-                        <a:t>pctRandomNull</a:t>
-                      </a:r>
-                      <a:r>
-                        <a:rPr lang="en-US" sz="1400" dirty="0" smtClean="0">
-                          <a:latin typeface="Courier"/>
-                          <a:cs typeface="Courier"/>
-                        </a:rPr>
-                        <a:t>": v</a:t>
-                      </a:r>
-                      <a:endParaRPr lang="en-US" sz="1400" dirty="0">
-                        <a:latin typeface="Courier"/>
+                        <a:t>fname</a:t>
+                      </a:r>
+                      <a:endParaRPr lang="en-US" sz="1800" dirty="0">
+                        <a:latin typeface="+mn-lt"/>
                         <a:cs typeface="Courier"/>
                       </a:endParaRPr>
                     </a:p>
@@ -7099,14 +7023,20 @@
                     <a:lstStyle/>
                     <a:p>
                       <a:r>
-                        <a:rPr lang="en-US" sz="1400" dirty="0" smtClean="0"/>
-                        <a:t>“Approximately” v%</a:t>
-                      </a:r>
-                      <a:r>
-                        <a:rPr lang="en-US" sz="1400" baseline="0" dirty="0" smtClean="0"/>
-                        <a:t> of the values will NOT be set.    Useful for creating sparse data</a:t>
-                      </a:r>
-                      <a:endParaRPr lang="en-US" sz="1400" dirty="0"/>
+                        <a:rPr lang="en-US" sz="1800" dirty="0" smtClean="0">
+                          <a:latin typeface="+mn-lt"/>
+                        </a:rPr>
+                        <a:t>First</a:t>
+                      </a:r>
+                      <a:r>
+                        <a:rPr lang="en-US" sz="1800" baseline="0" dirty="0" smtClean="0">
+                          <a:latin typeface="+mn-lt"/>
+                        </a:rPr>
+                        <a:t> name</a:t>
+                      </a:r>
+                      <a:endParaRPr lang="en-US" sz="1800" dirty="0">
+                        <a:latin typeface="+mn-lt"/>
+                      </a:endParaRPr>
                     </a:p>
                   </a:txBody>
                   <a:tcPr/>
@@ -7119,58 +7049,14 @@
                     <a:lstStyle/>
                     <a:p>
                       <a:r>
-                        <a:rPr lang="en-US" sz="1400" dirty="0" smtClean="0">
-                          <a:latin typeface="Courier"/>
+                        <a:rPr lang="en-US" sz="1800" dirty="0" smtClean="0">
+                          <a:latin typeface="+mn-lt"/>
                           <a:cs typeface="Courier"/>
                         </a:rPr>
-                        <a:t>"type": </a:t>
-                      </a:r>
-                      <a:r>
-                        <a:rPr lang="en-US" sz="1400" dirty="0" smtClean="0">
-                          <a:latin typeface="Courier"/>
-                          <a:cs typeface="Courier"/>
-                        </a:rPr>
-                        <a:t>”</a:t>
-                      </a:r>
-                      <a:r>
-                        <a:rPr lang="en-US" sz="1400" dirty="0" err="1" smtClean="0">
-                          <a:latin typeface="Courier"/>
-                          <a:cs typeface="Courier"/>
-                        </a:rPr>
-                        <a:t>oneOf</a:t>
-                      </a:r>
-                      <a:r>
-                        <a:rPr lang="en-US" sz="1400" dirty="0" smtClean="0">
-                          <a:latin typeface="Courier"/>
-                          <a:cs typeface="Courier"/>
-                        </a:rPr>
-                        <a:t>"</a:t>
-                      </a:r>
-                      <a:r>
-                        <a:rPr lang="en-US" sz="1400" dirty="0" smtClean="0">
-                          <a:latin typeface="Courier"/>
-                          <a:cs typeface="Courier"/>
-                        </a:rPr>
-                        <a:t>,</a:t>
-                      </a:r>
-                    </a:p>
-                    <a:p>
-                      <a:r>
-                        <a:rPr lang="en-US" sz="1400" dirty="0" smtClean="0">
-                          <a:latin typeface="Courier"/>
-                          <a:cs typeface="Courier"/>
-                        </a:rPr>
-                        <a:t>"items": [</a:t>
-                      </a:r>
-                      <a:r>
-                        <a:rPr lang="en-US" sz="1400" baseline="0" dirty="0" smtClean="0">
-                          <a:latin typeface="+mn-lt"/>
-                          <a:cs typeface="+mn-cs"/>
-                        </a:rPr>
-                        <a:t> ]</a:t>
-                      </a:r>
-                      <a:endParaRPr lang="en-US" sz="1400" dirty="0" smtClean="0">
-                        <a:latin typeface="Courier"/>
+                        <a:t>id</a:t>
+                      </a:r>
+                      <a:endParaRPr lang="en-US" sz="1800" dirty="0" smtClean="0">
+                        <a:latin typeface="+mn-lt"/>
                         <a:cs typeface="Courier"/>
                       </a:endParaRPr>
                     </a:p>
@@ -7183,34 +7069,26 @@
                     <a:lstStyle/>
                     <a:p>
                       <a:r>
-                        <a:rPr lang="en-US" sz="1400" dirty="0" smtClean="0"/>
-                        <a:t>P</a:t>
-                      </a:r>
-                      <a:r>
-                        <a:rPr lang="en-US" sz="1400" baseline="0" dirty="0" smtClean="0"/>
-                        <a:t>icks </a:t>
-                      </a:r>
-                      <a:r>
-                        <a:rPr lang="en-US" sz="1400" baseline="0" dirty="0" smtClean="0"/>
-                        <a:t>one of the children </a:t>
-                      </a:r>
-                      <a:r>
-                        <a:rPr lang="en-US" sz="1400" baseline="0" dirty="0" smtClean="0"/>
-                        <a:t>schemas at </a:t>
-                      </a:r>
-                      <a:r>
-                        <a:rPr lang="en-US" sz="1400" baseline="0" dirty="0" smtClean="0"/>
-                        <a:t>random</a:t>
-                      </a:r>
-                      <a:r>
-                        <a:rPr lang="en-US" sz="1400" baseline="0" dirty="0" smtClean="0"/>
-                        <a:t>.  Very useful for </a:t>
-                      </a:r>
-                      <a:r>
-                        <a:rPr lang="en-US" sz="1400" baseline="0" dirty="0" smtClean="0"/>
-                        <a:t>creating polymorphic data.</a:t>
-                      </a:r>
-                      <a:endParaRPr lang="en-US" sz="1400" dirty="0"/>
+                        <a:rPr lang="en-US" sz="1800" dirty="0" smtClean="0">
+                          <a:latin typeface="+mn-lt"/>
+                        </a:rPr>
+                        <a:t>A Type-4</a:t>
+                      </a:r>
+                      <a:r>
+                        <a:rPr lang="en-US" sz="1800" baseline="0" dirty="0" smtClean="0">
+                          <a:latin typeface="+mn-lt"/>
+                        </a:rPr>
+                        <a:t> </a:t>
+                      </a:r>
+                      <a:r>
+                        <a:rPr lang="en-US" sz="1800" dirty="0" smtClean="0">
+                          <a:latin typeface="+mn-lt"/>
+                        </a:rPr>
+                        <a:t>UUID</a:t>
+                      </a:r>
+                      <a:endParaRPr lang="en-US" sz="1800" dirty="0">
+                        <a:latin typeface="+mn-lt"/>
+                      </a:endParaRPr>
                     </a:p>
                   </a:txBody>
                   <a:tcPr/>
@@ -7275,6 +7153,672 @@
           <a:lstStyle/>
           <a:p>
             <a:r>
+              <a:rPr lang="en-US" dirty="0" smtClean="0"/>
+              <a:t>Cool new </a:t>
+            </a:r>
+            <a:r>
+              <a:rPr lang="en-US" dirty="0" err="1" smtClean="0"/>
+              <a:t>ipsum</a:t>
+            </a:r>
+            <a:r>
+              <a:rPr lang="en-US" dirty="0" smtClean="0"/>
+              <a:t> </a:t>
+            </a:r>
+            <a:r>
+              <a:rPr lang="en-US" dirty="0" smtClean="0"/>
+              <a:t>features</a:t>
+            </a:r>
+            <a:endParaRPr lang="en-US" dirty="0"/>
+          </a:p>
+        </p:txBody>
+      </p:sp>
+      <p:graphicFrame>
+        <p:nvGraphicFramePr>
+          <p:cNvPr id="6" name="Table 5"/>
+          <p:cNvGraphicFramePr>
+            <a:graphicFrameLocks noGrp="1"/>
+          </p:cNvGraphicFramePr>
+          <p:nvPr>
+            <p:extLst>
+              <p:ext uri="{D42A27DB-BD31-4B8C-83A1-F6EECF244321}">
+                <p14:modId xmlns:p14="http://schemas.microsoft.com/office/powerpoint/2010/main" val="3595074003"/>
+              </p:ext>
+            </p:extLst>
+          </p:nvPr>
+        </p:nvGraphicFramePr>
+        <p:xfrm>
+          <a:off x="825500" y="1219380"/>
+          <a:ext cx="7275286" cy="4613263"/>
+        </p:xfrm>
+        <a:graphic>
+          <a:graphicData uri="http://schemas.openxmlformats.org/drawingml/2006/table">
+            <a:tbl>
+              <a:tblPr firstRow="1" bandRow="1">
+                <a:tableStyleId>{5C22544A-7EE6-4342-B048-85BDC9FD1C3A}</a:tableStyleId>
+              </a:tblPr>
+              <a:tblGrid>
+                <a:gridCol w="2893786"/>
+                <a:gridCol w="4381500"/>
+              </a:tblGrid>
+              <a:tr h="370840">
+                <a:tc>
+                  <a:txBody>
+                    <a:bodyPr/>
+                    <a:lstStyle/>
+                    <a:p>
+                      <a:r>
+                        <a:rPr lang="en-US" sz="1400" dirty="0" smtClean="0"/>
+                        <a:t>Fragment</a:t>
+                      </a:r>
+                      <a:endParaRPr lang="en-US" sz="1400" dirty="0"/>
+                    </a:p>
+                  </a:txBody>
+                  <a:tcPr/>
+                </a:tc>
+                <a:tc>
+                  <a:txBody>
+                    <a:bodyPr/>
+                    <a:lstStyle/>
+                    <a:p>
+                      <a:r>
+                        <a:rPr lang="en-US" dirty="0" smtClean="0"/>
+                        <a:t>Description</a:t>
+                      </a:r>
+                      <a:endParaRPr lang="en-US" dirty="0"/>
+                    </a:p>
+                  </a:txBody>
+                  <a:tcPr/>
+                </a:tc>
+              </a:tr>
+              <a:tr h="1020651">
+                <a:tc>
+                  <a:txBody>
+                    <a:bodyPr/>
+                    <a:lstStyle/>
+                    <a:p>
+                      <a:r>
+                        <a:rPr lang="nl-NL" sz="1400" dirty="0" smtClean="0">
+                          <a:latin typeface="Courier"/>
+                          <a:cs typeface="Courier"/>
+                        </a:rPr>
+                        <a:t>"type": "</a:t>
+                      </a:r>
+                      <a:r>
+                        <a:rPr lang="nl-NL" sz="1400" dirty="0" err="1" smtClean="0">
+                          <a:latin typeface="Courier"/>
+                          <a:cs typeface="Courier"/>
+                        </a:rPr>
+                        <a:t>integer|number</a:t>
+                      </a:r>
+                      <a:r>
+                        <a:rPr lang="nl-NL" sz="1400" dirty="0" smtClean="0">
+                          <a:latin typeface="Courier"/>
+                          <a:cs typeface="Courier"/>
+                        </a:rPr>
+                        <a:t>"</a:t>
+                      </a:r>
+                      <a:r>
+                        <a:rPr lang="nl-NL" sz="1400" dirty="0" smtClean="0">
+                          <a:latin typeface="Courier"/>
+                          <a:cs typeface="Courier"/>
+                        </a:rPr>
+                        <a:t>,</a:t>
+                      </a:r>
+                    </a:p>
+                    <a:p>
+                      <a:r>
+                        <a:rPr lang="nl-NL" sz="1400" dirty="0" smtClean="0">
+                          <a:latin typeface="Courier"/>
+                          <a:cs typeface="Courier"/>
+                        </a:rPr>
+                        <a:t>"</a:t>
+                      </a:r>
+                      <a:r>
+                        <a:rPr lang="nl-NL" sz="1400" dirty="0" err="1" smtClean="0">
+                          <a:latin typeface="Courier"/>
+                          <a:cs typeface="Courier"/>
+                        </a:rPr>
+                        <a:t>ipsum</a:t>
+                      </a:r>
+                      <a:r>
+                        <a:rPr lang="nl-NL" sz="1400" dirty="0" smtClean="0">
+                          <a:latin typeface="Courier"/>
+                          <a:cs typeface="Courier"/>
+                        </a:rPr>
+                        <a:t>": { "</a:t>
+                      </a:r>
+                      <a:r>
+                        <a:rPr lang="nl-NL" sz="1400" dirty="0" err="1" smtClean="0">
+                          <a:latin typeface="Courier"/>
+                          <a:cs typeface="Courier"/>
+                        </a:rPr>
+                        <a:t>inc</a:t>
+                      </a:r>
+                      <a:r>
+                        <a:rPr lang="nl-NL" sz="1400" dirty="0" smtClean="0">
+                          <a:latin typeface="Courier"/>
+                          <a:cs typeface="Courier"/>
+                        </a:rPr>
+                        <a:t>": {”start”: v2, “val”: v3}</a:t>
+                      </a:r>
+                      <a:endParaRPr lang="en-US" sz="1400" dirty="0">
+                        <a:latin typeface="Courier"/>
+                        <a:cs typeface="Courier"/>
+                      </a:endParaRPr>
+                    </a:p>
+                  </a:txBody>
+                  <a:tcPr/>
+                </a:tc>
+                <a:tc>
+                  <a:txBody>
+                    <a:bodyPr/>
+                    <a:lstStyle/>
+                    <a:p>
+                      <a:r>
+                        <a:rPr lang="en-US" sz="1400" dirty="0" smtClean="0"/>
+                        <a:t>Instead of random </a:t>
+                      </a:r>
+                      <a:r>
+                        <a:rPr lang="en-US" sz="1400" dirty="0" err="1" smtClean="0"/>
+                        <a:t>int</a:t>
+                      </a:r>
+                      <a:r>
+                        <a:rPr lang="en-US" sz="1400" dirty="0" smtClean="0"/>
+                        <a:t> or float,  </a:t>
+                      </a:r>
+                      <a:r>
+                        <a:rPr lang="en-US" sz="1400" dirty="0" smtClean="0"/>
+                        <a:t>start with value</a:t>
+                      </a:r>
+                      <a:r>
+                        <a:rPr lang="en-US" sz="1400" baseline="0" dirty="0" smtClean="0"/>
+                        <a:t> v2 and add v3 for each successive record.  v3 can be negative.  U</a:t>
+                      </a:r>
+                      <a:r>
+                        <a:rPr lang="en-US" sz="1400" dirty="0" smtClean="0"/>
+                        <a:t>seful for creating</a:t>
+                      </a:r>
+                      <a:r>
+                        <a:rPr lang="en-US" sz="1400" baseline="0" dirty="0" smtClean="0"/>
+                        <a:t> things like message </a:t>
+                      </a:r>
+                      <a:r>
+                        <a:rPr lang="en-US" sz="1400" baseline="0" dirty="0" smtClean="0"/>
+                        <a:t>sequence numbers</a:t>
+                      </a:r>
+                      <a:r>
+                        <a:rPr lang="en-US" sz="1400" baseline="0" dirty="0" smtClean="0"/>
+                        <a:t>.  </a:t>
+                      </a:r>
+                      <a:endParaRPr lang="en-US" sz="1400" dirty="0"/>
+                    </a:p>
+                  </a:txBody>
+                  <a:tcPr/>
+                </a:tc>
+              </a:tr>
+              <a:tr h="1247203">
+                <a:tc>
+                  <a:txBody>
+                    <a:bodyPr/>
+                    <a:lstStyle/>
+                    <a:p>
+                      <a:r>
+                        <a:rPr lang="nl-NL" sz="1400" dirty="0" smtClean="0">
+                          <a:latin typeface="Courier"/>
+                          <a:cs typeface="Courier"/>
+                        </a:rPr>
+                        <a:t>String/date-time</a:t>
+                      </a:r>
+                    </a:p>
+                    <a:p>
+                      <a:r>
+                        <a:rPr lang="nl-NL" sz="1400" dirty="0" smtClean="0">
+                          <a:latin typeface="Courier"/>
+                          <a:cs typeface="Courier"/>
+                        </a:rPr>
+                        <a:t>"</a:t>
+                      </a:r>
+                      <a:r>
+                        <a:rPr lang="nl-NL" sz="1400" dirty="0" err="1" smtClean="0">
+                          <a:latin typeface="Courier"/>
+                          <a:cs typeface="Courier"/>
+                        </a:rPr>
+                        <a:t>ipsum</a:t>
+                      </a:r>
+                      <a:r>
+                        <a:rPr lang="nl-NL" sz="1400" dirty="0" smtClean="0">
+                          <a:latin typeface="Courier"/>
+                          <a:cs typeface="Courier"/>
+                        </a:rPr>
+                        <a:t>": { "</a:t>
+                      </a:r>
+                      <a:r>
+                        <a:rPr lang="nl-NL" sz="1400" dirty="0" err="1" smtClean="0">
+                          <a:latin typeface="Courier"/>
+                          <a:cs typeface="Courier"/>
+                        </a:rPr>
+                        <a:t>inc</a:t>
+                      </a:r>
+                      <a:r>
+                        <a:rPr lang="nl-NL" sz="1400" dirty="0" smtClean="0">
+                          <a:latin typeface="Courier"/>
+                          <a:cs typeface="Courier"/>
+                        </a:rPr>
+                        <a:t>": {”start”: v2, “</a:t>
+                      </a:r>
+                      <a:r>
+                        <a:rPr lang="nl-NL" sz="1400" dirty="0" err="1" smtClean="0">
+                          <a:latin typeface="Courier"/>
+                          <a:cs typeface="Courier"/>
+                        </a:rPr>
+                        <a:t>secs|mins|hrs|days</a:t>
+                      </a:r>
+                      <a:r>
+                        <a:rPr lang="nl-NL" sz="1400" dirty="0" smtClean="0">
+                          <a:latin typeface="Courier"/>
+                          <a:cs typeface="Courier"/>
+                        </a:rPr>
+                        <a:t>”: v3}</a:t>
+                      </a:r>
+                      <a:endParaRPr lang="en-US" sz="1400" dirty="0">
+                        <a:latin typeface="Courier"/>
+                        <a:cs typeface="Courier"/>
+                      </a:endParaRPr>
+                    </a:p>
+                  </a:txBody>
+                  <a:tcPr/>
+                </a:tc>
+                <a:tc>
+                  <a:txBody>
+                    <a:bodyPr/>
+                    <a:lstStyle/>
+                    <a:p>
+                      <a:r>
+                        <a:rPr lang="en-US" sz="1400" dirty="0" smtClean="0"/>
+                        <a:t>Instead of random date,  start with string </a:t>
+                      </a:r>
+                      <a:r>
+                        <a:rPr lang="en-US" sz="1400" baseline="0" dirty="0" smtClean="0"/>
+                        <a:t>v2 and add some number of </a:t>
+                      </a:r>
+                      <a:r>
+                        <a:rPr lang="en-US" sz="1400" baseline="0" dirty="0" err="1" smtClean="0"/>
+                        <a:t>secs</a:t>
+                      </a:r>
+                      <a:r>
+                        <a:rPr lang="en-US" sz="1400" baseline="0" dirty="0" smtClean="0"/>
+                        <a:t>, </a:t>
+                      </a:r>
+                      <a:r>
+                        <a:rPr lang="en-US" sz="1400" baseline="0" dirty="0" err="1" smtClean="0"/>
+                        <a:t>mins</a:t>
+                      </a:r>
+                      <a:r>
+                        <a:rPr lang="en-US" sz="1400" baseline="0" dirty="0" smtClean="0"/>
+                        <a:t>, </a:t>
+                      </a:r>
+                      <a:r>
+                        <a:rPr lang="en-US" sz="1400" baseline="0" dirty="0" err="1" smtClean="0"/>
+                        <a:t>hrs</a:t>
+                      </a:r>
+                      <a:r>
+                        <a:rPr lang="en-US" sz="1400" baseline="0" dirty="0" smtClean="0"/>
+                        <a:t>, or days v3 for each successive record.  v3 can be negative.   v2 is any string </a:t>
+                      </a:r>
+                      <a:r>
+                        <a:rPr lang="en-US" sz="1400" baseline="0" dirty="0" err="1" smtClean="0"/>
+                        <a:t>parsable</a:t>
+                      </a:r>
+                      <a:r>
+                        <a:rPr lang="en-US" sz="1400" baseline="0" dirty="0" smtClean="0"/>
+                        <a:t> by </a:t>
+                      </a:r>
+                      <a:r>
+                        <a:rPr lang="en-US" sz="1400" baseline="0" dirty="0" err="1" smtClean="0">
+                          <a:latin typeface="Courier"/>
+                          <a:cs typeface="Courier"/>
+                        </a:rPr>
+                        <a:t>dateutil.parser.parse</a:t>
+                      </a:r>
+                      <a:r>
+                        <a:rPr lang="en-US" sz="1400" baseline="0" dirty="0" smtClean="0">
+                          <a:latin typeface="Courier"/>
+                          <a:cs typeface="Courier"/>
+                        </a:rPr>
+                        <a:t>()</a:t>
+                      </a:r>
+                      <a:endParaRPr lang="en-US" sz="1400" dirty="0">
+                        <a:latin typeface="Courier"/>
+                        <a:cs typeface="Courier"/>
+                      </a:endParaRPr>
+                    </a:p>
+                  </a:txBody>
+                  <a:tcPr/>
+                </a:tc>
+              </a:tr>
+              <a:tr h="728205">
+                <a:tc>
+                  <a:txBody>
+                    <a:bodyPr/>
+                    <a:lstStyle/>
+                    <a:p>
+                      <a:r>
+                        <a:rPr lang="en-US" sz="1400" dirty="0" smtClean="0">
+                          <a:latin typeface="Courier"/>
+                          <a:cs typeface="Courier"/>
+                        </a:rPr>
+                        <a:t>"type": "string",</a:t>
+                      </a:r>
+                    </a:p>
+                    <a:p>
+                      <a:r>
+                        <a:rPr lang="en-US" sz="1400" dirty="0" smtClean="0">
+                          <a:latin typeface="Courier"/>
+                          <a:cs typeface="Courier"/>
+                        </a:rPr>
+                        <a:t>"</a:t>
+                      </a:r>
+                      <a:r>
+                        <a:rPr lang="en-US" sz="1400" dirty="0" err="1" smtClean="0">
+                          <a:latin typeface="Courier"/>
+                          <a:cs typeface="Courier"/>
+                        </a:rPr>
+                        <a:t>ipsum</a:t>
+                      </a:r>
+                      <a:r>
+                        <a:rPr lang="en-US" sz="1400" dirty="0" smtClean="0">
+                          <a:latin typeface="Courier"/>
+                          <a:cs typeface="Courier"/>
+                        </a:rPr>
+                        <a:t>": "</a:t>
+                      </a:r>
+                      <a:r>
+                        <a:rPr lang="en-US" sz="1400" dirty="0" err="1" smtClean="0">
+                          <a:latin typeface="Courier"/>
+                          <a:cs typeface="Courier"/>
+                        </a:rPr>
+                        <a:t>bson:ObjectId</a:t>
+                      </a:r>
+                      <a:r>
+                        <a:rPr lang="en-US" sz="1400" dirty="0" smtClean="0">
+                          <a:latin typeface="Courier"/>
+                          <a:cs typeface="Courier"/>
+                        </a:rPr>
+                        <a:t>"</a:t>
+                      </a:r>
+                      <a:endParaRPr lang="en-US" sz="1400" dirty="0">
+                        <a:latin typeface="Courier"/>
+                        <a:cs typeface="Courier"/>
+                      </a:endParaRPr>
+                    </a:p>
+                  </a:txBody>
+                  <a:tcPr/>
+                </a:tc>
+                <a:tc>
+                  <a:txBody>
+                    <a:bodyPr/>
+                    <a:lstStyle/>
+                    <a:p>
+                      <a:r>
+                        <a:rPr lang="en-US" sz="1400" dirty="0" smtClean="0"/>
+                        <a:t>Generate valid unique </a:t>
+                      </a:r>
+                      <a:r>
+                        <a:rPr lang="en-US" sz="1400" dirty="0" err="1" smtClean="0"/>
+                        <a:t>ObjectIds</a:t>
+                      </a:r>
+                      <a:r>
+                        <a:rPr lang="en-US" sz="1400" dirty="0" smtClean="0"/>
+                        <a:t> </a:t>
+                      </a:r>
+                      <a:r>
+                        <a:rPr lang="en-US" sz="1400" dirty="0" err="1" smtClean="0"/>
+                        <a:t>ala</a:t>
+                      </a:r>
+                      <a:r>
+                        <a:rPr lang="en-US" sz="1400" dirty="0" smtClean="0"/>
+                        <a:t> </a:t>
+                      </a:r>
+                    </a:p>
+                    <a:p>
+                      <a:r>
+                        <a:rPr lang="fi-FI" sz="1400" baseline="0" dirty="0" smtClean="0"/>
+                        <a:t>{"$</a:t>
+                      </a:r>
+                      <a:r>
+                        <a:rPr lang="fi-FI" sz="1400" baseline="0" dirty="0" err="1" smtClean="0"/>
+                        <a:t>oid</a:t>
+                      </a:r>
+                      <a:r>
+                        <a:rPr lang="fi-FI" sz="1400" baseline="0" dirty="0" smtClean="0"/>
+                        <a:t>": "52d6c77b4142435025d7c563"}</a:t>
+                      </a:r>
+                      <a:endParaRPr lang="en-US" sz="1400" dirty="0">
+                        <a:latin typeface="Courier"/>
+                        <a:cs typeface="Courier"/>
+                      </a:endParaRPr>
+                    </a:p>
+                  </a:txBody>
+                  <a:tcPr/>
+                </a:tc>
+              </a:tr>
+              <a:tr h="728205">
+                <a:tc>
+                  <a:txBody>
+                    <a:bodyPr/>
+                    <a:lstStyle/>
+                    <a:p>
+                      <a:r>
+                        <a:rPr lang="en-US" sz="1400" dirty="0" smtClean="0">
+                          <a:latin typeface="Courier"/>
+                          <a:cs typeface="Courier"/>
+                        </a:rPr>
+                        <a:t>"</a:t>
+                      </a:r>
+                      <a:r>
+                        <a:rPr lang="en-US" sz="1400" dirty="0" err="1" smtClean="0">
+                          <a:latin typeface="Courier"/>
+                          <a:cs typeface="Courier"/>
+                        </a:rPr>
+                        <a:t>pctRandomNull</a:t>
+                      </a:r>
+                      <a:r>
+                        <a:rPr lang="en-US" sz="1400" dirty="0" smtClean="0">
+                          <a:latin typeface="Courier"/>
+                          <a:cs typeface="Courier"/>
+                        </a:rPr>
+                        <a:t>": v</a:t>
+                      </a:r>
+                      <a:endParaRPr lang="en-US" sz="1400" dirty="0">
+                        <a:latin typeface="Courier"/>
+                        <a:cs typeface="Courier"/>
+                      </a:endParaRPr>
+                    </a:p>
+                  </a:txBody>
+                  <a:tcPr/>
+                </a:tc>
+                <a:tc>
+                  <a:txBody>
+                    <a:bodyPr/>
+                    <a:lstStyle/>
+                    <a:p>
+                      <a:r>
+                        <a:rPr lang="en-US" sz="1400" dirty="0" smtClean="0"/>
+                        <a:t>“Approximately” v%</a:t>
+                      </a:r>
+                      <a:r>
+                        <a:rPr lang="en-US" sz="1400" baseline="0" dirty="0" smtClean="0"/>
+                        <a:t> of the values will NOT be set.    Useful for creating sparse data</a:t>
+                      </a:r>
+                      <a:endParaRPr lang="en-US" sz="1400" dirty="0"/>
+                    </a:p>
+                  </a:txBody>
+                  <a:tcPr/>
+                </a:tc>
+              </a:tr>
+              <a:tr h="370840">
+                <a:tc>
+                  <a:txBody>
+                    <a:bodyPr/>
+                    <a:lstStyle/>
+                    <a:p>
+                      <a:r>
+                        <a:rPr lang="en-US" sz="1400" dirty="0" smtClean="0">
+                          <a:latin typeface="Courier"/>
+                          <a:cs typeface="Courier"/>
+                        </a:rPr>
+                        <a:t>"type": </a:t>
+                      </a:r>
+                      <a:r>
+                        <a:rPr lang="en-US" sz="1400" dirty="0" smtClean="0">
+                          <a:latin typeface="Courier"/>
+                          <a:cs typeface="Courier"/>
+                        </a:rPr>
+                        <a:t>”</a:t>
+                      </a:r>
+                      <a:r>
+                        <a:rPr lang="en-US" sz="1400" dirty="0" err="1" smtClean="0">
+                          <a:latin typeface="Courier"/>
+                          <a:cs typeface="Courier"/>
+                        </a:rPr>
+                        <a:t>oneOf</a:t>
+                      </a:r>
+                      <a:r>
+                        <a:rPr lang="en-US" sz="1400" dirty="0" smtClean="0">
+                          <a:latin typeface="Courier"/>
+                          <a:cs typeface="Courier"/>
+                        </a:rPr>
+                        <a:t>"</a:t>
+                      </a:r>
+                      <a:r>
+                        <a:rPr lang="en-US" sz="1400" dirty="0" smtClean="0">
+                          <a:latin typeface="Courier"/>
+                          <a:cs typeface="Courier"/>
+                        </a:rPr>
+                        <a:t>,</a:t>
+                      </a:r>
+                    </a:p>
+                    <a:p>
+                      <a:r>
+                        <a:rPr lang="en-US" sz="1400" dirty="0" smtClean="0">
+                          <a:latin typeface="Courier"/>
+                          <a:cs typeface="Courier"/>
+                        </a:rPr>
+                        <a:t>"items": [</a:t>
+                      </a:r>
+                      <a:r>
+                        <a:rPr lang="en-US" sz="1400" baseline="0" dirty="0" smtClean="0">
+                          <a:latin typeface="+mn-lt"/>
+                          <a:cs typeface="+mn-cs"/>
+                        </a:rPr>
+                        <a:t> ]</a:t>
+                      </a:r>
+                      <a:endParaRPr lang="en-US" sz="1400" dirty="0" smtClean="0">
+                        <a:latin typeface="Courier"/>
+                        <a:cs typeface="Courier"/>
+                      </a:endParaRPr>
+                    </a:p>
+                  </a:txBody>
+                  <a:tcPr/>
+                </a:tc>
+                <a:tc>
+                  <a:txBody>
+                    <a:bodyPr/>
+                    <a:lstStyle/>
+                    <a:p>
+                      <a:r>
+                        <a:rPr lang="en-US" sz="1400" dirty="0" smtClean="0"/>
+                        <a:t>P</a:t>
+                      </a:r>
+                      <a:r>
+                        <a:rPr lang="en-US" sz="1400" baseline="0" dirty="0" smtClean="0"/>
+                        <a:t>icks </a:t>
+                      </a:r>
+                      <a:r>
+                        <a:rPr lang="en-US" sz="1400" baseline="0" dirty="0" smtClean="0"/>
+                        <a:t>one of the children </a:t>
+                      </a:r>
+                      <a:r>
+                        <a:rPr lang="en-US" sz="1400" baseline="0" dirty="0" smtClean="0"/>
+                        <a:t>schemas at </a:t>
+                      </a:r>
+                      <a:r>
+                        <a:rPr lang="en-US" sz="1400" baseline="0" dirty="0" smtClean="0"/>
+                        <a:t>random</a:t>
+                      </a:r>
+                      <a:r>
+                        <a:rPr lang="en-US" sz="1400" baseline="0" dirty="0" smtClean="0"/>
+                        <a:t>.  Very useful for </a:t>
+                      </a:r>
+                      <a:r>
+                        <a:rPr lang="en-US" sz="1400" baseline="0" dirty="0" smtClean="0"/>
+                        <a:t>creating polymorphic data.</a:t>
+                      </a:r>
+                      <a:endParaRPr lang="en-US" sz="1400" dirty="0"/>
+                    </a:p>
+                  </a:txBody>
+                  <a:tcPr/>
+                </a:tc>
+              </a:tr>
+            </a:tbl>
+          </a:graphicData>
+        </a:graphic>
+      </p:graphicFrame>
+    </p:spTree>
+    <p:extLst>
+      <p:ext uri="{BB962C8B-B14F-4D97-AF65-F5344CB8AC3E}">
+        <p14:creationId xmlns:p14="http://schemas.microsoft.com/office/powerpoint/2010/main" val="1342832845"/>
+      </p:ext>
+    </p:extLst>
+  </p:cSld>
+  <p:clrMapOvr>
+    <a:masterClrMapping/>
+  </p:clrMapOvr>
+  <p:timing>
+    <p:tnLst>
+      <p:par>
+        <p:cTn xmlns:p14="http://schemas.microsoft.com/office/powerpoint/2010/main" id="1" dur="indefinite" restart="never" nodeType="tmRoot"/>
+      </p:par>
+    </p:tnLst>
+  </p:timing>
+</p:sld>
+</file>
+
+<file path=ppt/slides/slide7.xml><?xml version="1.0" encoding="utf-8"?>
+<p:sld xmlns:a="http://schemas.openxmlformats.org/drawingml/2006/main" xmlns:r="http://schemas.openxmlformats.org/officeDocument/2006/relationships" xmlns:p="http://schemas.openxmlformats.org/presentationml/2006/main">
+  <p:cSld>
+    <p:spTree>
+      <p:nvGrpSpPr>
+        <p:cNvPr id="1" name=""/>
+        <p:cNvGrpSpPr/>
+        <p:nvPr/>
+      </p:nvGrpSpPr>
+      <p:grpSpPr>
+        <a:xfrm>
+          <a:off x="0" y="0"/>
+          <a:ext cx="0" cy="0"/>
+          <a:chOff x="0" y="0"/>
+          <a:chExt cx="0" cy="0"/>
+        </a:xfrm>
+      </p:grpSpPr>
+      <p:sp>
+        <p:nvSpPr>
+          <p:cNvPr id="2" name="Title 1"/>
+          <p:cNvSpPr>
+            <a:spLocks noGrp="1"/>
+          </p:cNvSpPr>
+          <p:nvPr>
+            <p:ph type="title"/>
+          </p:nvPr>
+        </p:nvSpPr>
+        <p:spPr/>
+        <p:txBody>
+          <a:bodyPr>
+            <a:normAutofit/>
+          </a:bodyPr>
+          <a:lstStyle/>
+          <a:p>
+            <a:r>
               <a:rPr lang="en-US" dirty="0"/>
               <a:t>B</a:t>
             </a:r>
@@ -7514,27 +8058,27 @@
               <a:t>}     </a:t>
             </a:r>
             <a:r>
-              <a:rPr lang="en-US" sz="1000" dirty="0" smtClean="0">
+              <a:rPr lang="en-US" sz="1200" dirty="0" smtClean="0">
                 <a:latin typeface="Courier"/>
                 <a:cs typeface="Courier"/>
               </a:rPr>
               <a:t>15-Jan-2014: just discovered 2.5.x emits $</a:t>
             </a:r>
             <a:r>
-              <a:rPr lang="en-US" sz="1000" dirty="0" err="1" smtClean="0">
+              <a:rPr lang="en-US" sz="1200" dirty="0" err="1" smtClean="0">
                 <a:latin typeface="Courier"/>
                 <a:cs typeface="Courier"/>
               </a:rPr>
               <a:t>numberLong</a:t>
             </a:r>
             <a:r>
-              <a:rPr lang="en-US" sz="1000" dirty="0" smtClean="0">
+              <a:rPr lang="en-US" sz="1200" dirty="0" smtClean="0">
                 <a:latin typeface="Courier"/>
                 <a:cs typeface="Courier"/>
               </a:rPr>
               <a:t>!</a:t>
             </a:r>
-            <a:endParaRPr lang="en-US" sz="1000" dirty="0" smtClean="0">
+            <a:endParaRPr lang="en-US" sz="1200" dirty="0" smtClean="0">
               <a:latin typeface="Courier"/>
               <a:cs typeface="Courier"/>
             </a:endParaRPr>
@@ -7588,7 +8132,7 @@
 </p:sld>
 </file>
 
-<file path=ppt/slides/slide7.xml><?xml version="1.0" encoding="utf-8"?>
+<file path=ppt/slides/slide8.xml><?xml version="1.0" encoding="utf-8"?>
 <p:sld xmlns:a="http://schemas.openxmlformats.org/drawingml/2006/main" xmlns:r="http://schemas.openxmlformats.org/officeDocument/2006/relationships" xmlns:p="http://schemas.openxmlformats.org/presentationml/2006/main">
   <p:cSld>
     <p:spTree>
@@ -8404,7 +8948,7 @@
 </p:sld>
 </file>
 
-<file path=ppt/slides/slide8.xml><?xml version="1.0" encoding="utf-8"?>
+<file path=ppt/slides/slide9.xml><?xml version="1.0" encoding="utf-8"?>
 <p:sld xmlns:a="http://schemas.openxmlformats.org/drawingml/2006/main" xmlns:r="http://schemas.openxmlformats.org/officeDocument/2006/relationships" xmlns:p="http://schemas.openxmlformats.org/presentationml/2006/main">
   <p:cSld>
     <p:spTree>
@@ -8455,7 +8999,7 @@
         <p:spPr>
           <a:xfrm>
             <a:off x="628403" y="1206654"/>
-            <a:ext cx="7499597" cy="2523768"/>
+            <a:ext cx="7499597" cy="3631763"/>
           </a:xfrm>
           <a:prstGeom prst="rect">
             <a:avLst/>
@@ -8533,6 +9077,48 @@
                 <a:cs typeface="Courier"/>
               </a:rPr>
               <a:t> tried it for something and it did not crash and burn</a:t>
+            </a:r>
+          </a:p>
+          <a:p>
+            <a:pPr marL="342900" indent="-342900">
+              <a:buFont typeface="Arial"/>
+              <a:buChar char="•"/>
+            </a:pPr>
+            <a:r>
+              <a:rPr lang="en-US" sz="2400" dirty="0" err="1" smtClean="0">
+                <a:cs typeface="Courier"/>
+              </a:rPr>
+              <a:t>ObjectId</a:t>
+            </a:r>
+            <a:r>
+              <a:rPr lang="en-US" sz="2400" dirty="0" smtClean="0">
+                <a:cs typeface="Courier"/>
+              </a:rPr>
+              <a:t>() types cannot be used in RAW mode for </a:t>
+            </a:r>
+            <a:r>
+              <a:rPr lang="en-US" sz="2400" dirty="0" err="1" smtClean="0">
+                <a:cs typeface="Courier"/>
+              </a:rPr>
+              <a:t>ipsum</a:t>
+            </a:r>
+            <a:r>
+              <a:rPr lang="en-US" sz="2400" dirty="0" smtClean="0">
+                <a:cs typeface="Courier"/>
+              </a:rPr>
+              <a:t> (yet) unless </a:t>
+            </a:r>
+            <a:r>
+              <a:rPr lang="en-US" sz="2400" dirty="0" err="1" smtClean="0">
+                <a:cs typeface="Courier"/>
+              </a:rPr>
+              <a:t>bson</a:t>
+            </a:r>
+            <a:r>
+              <a:rPr lang="en-US" sz="2400" dirty="0" smtClean="0">
+                <a:cs typeface="Courier"/>
+              </a:rPr>
+              <a:t> library dependency is introduced….</a:t>
             </a:r>
             <a:endParaRPr lang="en-US" sz="2400" dirty="0">
               <a:cs typeface="Courier"/>

</xml_diff>

<commit_message>
Add ref to jsonschema.net
</commit_message>
<xml_diff>
--- a/ipsum.pptx
+++ b/ipsum.pptx
@@ -213,7 +213,7 @@
           <a:p>
             <a:fld id="{809650F9-9A3E-EC42-ACF5-9A50B944BD6F}" type="datetimeFigureOut">
               <a:rPr lang="en-US" smtClean="0"/>
-              <a:t>1/21/14</a:t>
+              <a:t>1/23/14</a:t>
             </a:fld>
             <a:endParaRPr lang="en-US"/>
           </a:p>
@@ -378,7 +378,7 @@
           <a:p>
             <a:fld id="{432F3386-1435-B645-8E2D-EAE70419FE1C}" type="datetimeFigureOut">
               <a:rPr lang="en-US" smtClean="0"/>
-              <a:t>1/21/14</a:t>
+              <a:t>1/23/14</a:t>
             </a:fld>
             <a:endParaRPr lang="en-US"/>
           </a:p>
@@ -5422,11 +5422,7 @@
             </a:r>
             <a:r>
               <a:rPr lang="en-US" dirty="0" smtClean="0"/>
-              <a:t> hello </a:t>
-            </a:r>
-            <a:r>
-              <a:rPr lang="en-US" dirty="0" smtClean="0"/>
-              <a:t>world, of sorts…</a:t>
+              <a:t> hello world, of sorts…</a:t>
             </a:r>
             <a:endParaRPr lang="en-US" dirty="0"/>
           </a:p>
@@ -5459,44 +5455,30 @@
                 <a:latin typeface="Courier"/>
                 <a:cs typeface="Courier"/>
               </a:rPr>
-              <a:t>&gt; </a:t>
+              <a:t>&gt; load(”</a:t>
+            </a:r>
+            <a:r>
+              <a:rPr lang="en-US" sz="1200" dirty="0" err="1" smtClean="0">
+                <a:latin typeface="Courier"/>
+                <a:cs typeface="Courier"/>
+              </a:rPr>
+              <a:t>BCTest.js</a:t>
             </a:r>
             <a:r>
               <a:rPr lang="en-US" sz="1200" dirty="0">
                 <a:latin typeface="Courier"/>
                 <a:cs typeface="Courier"/>
               </a:rPr>
-              <a:t>load</a:t>
-            </a:r>
+              <a:t>")</a:t>
+            </a:r>
+          </a:p>
+          <a:p>
             <a:r>
               <a:rPr lang="en-US" sz="1200" dirty="0" smtClean="0">
                 <a:latin typeface="Courier"/>
                 <a:cs typeface="Courier"/>
               </a:rPr>
-              <a:t>(”</a:t>
-            </a:r>
-            <a:r>
-              <a:rPr lang="en-US" sz="1200" dirty="0" err="1" smtClean="0">
-                <a:latin typeface="Courier"/>
-                <a:cs typeface="Courier"/>
-              </a:rPr>
-              <a:t>BCTest.js</a:t>
-            </a:r>
-            <a:r>
-              <a:rPr lang="en-US" sz="1200" dirty="0">
-                <a:latin typeface="Courier"/>
-                <a:cs typeface="Courier"/>
-              </a:rPr>
-              <a:t>")</a:t>
-            </a:r>
-          </a:p>
-          <a:p>
-            <a:r>
-              <a:rPr lang="en-US" sz="1200" dirty="0" smtClean="0">
-                <a:latin typeface="Courier"/>
-                <a:cs typeface="Courier"/>
-              </a:rPr>
-              <a:t>True</a:t>
+              <a:t>true</a:t>
             </a:r>
           </a:p>
           <a:p>
@@ -6209,13 +6191,6 @@
             </a:endParaRPr>
           </a:p>
           <a:p>
-            <a:r>
-              <a:rPr lang="en-US" sz="1200" dirty="0" smtClean="0">
-                <a:latin typeface="Courier"/>
-                <a:cs typeface="Courier"/>
-              </a:rPr>
-              <a:t/>
-            </a:r>
             <a:endParaRPr lang="en-US" sz="1200" dirty="0">
               <a:latin typeface="Courier"/>
               <a:cs typeface="Courier"/>
@@ -6295,7 +6270,6 @@
               <a:rPr lang="en-US" dirty="0" smtClean="0"/>
               <a:t>, etc.</a:t>
             </a:r>
-            <a:endParaRPr lang="en-US" dirty="0" smtClean="0"/>
           </a:p>
         </p:txBody>
       </p:sp>
@@ -6877,7 +6851,7 @@
         </p:nvSpPr>
         <p:spPr>
           <a:xfrm>
-            <a:off x="811428" y="1272042"/>
+            <a:off x="811428" y="1253088"/>
             <a:ext cx="6967964" cy="1384995"/>
           </a:xfrm>
           <a:prstGeom prst="rect">
@@ -7065,11 +7039,7 @@
             </a:r>
             <a:r>
               <a:rPr lang="en-US" dirty="0" smtClean="0"/>
-              <a:t>ollection:  If </a:t>
-            </a:r>
-            <a:r>
-              <a:rPr lang="en-US" dirty="0" smtClean="0"/>
-              <a:t>present, will be used to get counts and indexes (set is </a:t>
+              <a:t>ollection:  If present, will be used to get counts and indexes (set is </a:t>
             </a:r>
             <a:r>
               <a:rPr lang="en-US" dirty="0" err="1" smtClean="0"/>
@@ -7133,7 +7103,6 @@
               <a:rPr lang="en-US" dirty="0" smtClean="0"/>
               <a:t>() of value returned from test (typically a cursor)</a:t>
             </a:r>
-            <a:endParaRPr lang="en-US" dirty="0" smtClean="0"/>
           </a:p>
         </p:txBody>
       </p:sp>
@@ -8667,19 +8636,7 @@
               <a:rPr lang="en-US" dirty="0" smtClean="0">
                 <a:cs typeface="Courier"/>
               </a:rPr>
-              <a:t> tried it </a:t>
-            </a:r>
-            <a:r>
-              <a:rPr lang="en-US" dirty="0" smtClean="0">
-                <a:cs typeface="Courier"/>
-              </a:rPr>
-              <a:t>and </a:t>
-            </a:r>
-            <a:r>
-              <a:rPr lang="en-US" dirty="0" smtClean="0">
-                <a:cs typeface="Courier"/>
-              </a:rPr>
-              <a:t>it did not crash and burn</a:t>
+              <a:t> tried it and it did not crash and burn</a:t>
             </a:r>
           </a:p>
           <a:p>
@@ -8735,7 +8692,27 @@
               <a:buFont typeface="Arial"/>
               <a:buChar char="•"/>
             </a:pPr>
-            <a:endParaRPr lang="en-US" dirty="0">
+            <a:r>
+              <a:rPr lang="en-US" dirty="0">
+                <a:cs typeface="Courier"/>
+                <a:hlinkClick r:id="rId3"/>
+              </a:rPr>
+              <a:t>http://</a:t>
+            </a:r>
+            <a:r>
+              <a:rPr lang="en-US" dirty="0" smtClean="0">
+                <a:cs typeface="Courier"/>
+                <a:hlinkClick r:id="rId3"/>
+              </a:rPr>
+              <a:t>www.jsonschema.net</a:t>
+            </a:r>
+            <a:r>
+              <a:rPr lang="en-US" dirty="0" smtClean="0">
+                <a:cs typeface="Courier"/>
+              </a:rPr>
+              <a:t>  : Online shape-to-schema utility</a:t>
+            </a:r>
+            <a:endParaRPr lang="en-US" dirty="0" smtClean="0">
               <a:cs typeface="Courier"/>
             </a:endParaRPr>
           </a:p>
@@ -10751,25 +10728,7 @@
               <a:rPr lang="en-US" dirty="0" smtClean="0">
                 <a:cs typeface="Courier"/>
               </a:rPr>
-              <a:t>~150,000 </a:t>
-            </a:r>
-            <a:r>
-              <a:rPr lang="en-US" dirty="0" smtClean="0">
-                <a:cs typeface="Courier"/>
-              </a:rPr>
-              <a:t>“properties per second” </a:t>
-            </a:r>
-            <a:r>
-              <a:rPr lang="en-US" dirty="0" smtClean="0">
-                <a:cs typeface="Courier"/>
-              </a:rPr>
-              <a:t>(~3.5MB/sec) on </a:t>
-            </a:r>
-            <a:r>
-              <a:rPr lang="en-US" dirty="0" smtClean="0">
-                <a:cs typeface="Courier"/>
-              </a:rPr>
-              <a:t>a </a:t>
+              <a:t>~150,000 “properties per second” (~3.5MB/sec) on a </a:t>
             </a:r>
             <a:r>
               <a:rPr lang="en-US" dirty="0" err="1" smtClean="0">

</xml_diff>